<commit_message>
added user guide and developer guide for new send / login command updated architecture diagram to include Email
</commit_message>
<xml_diff>
--- a/docs/diagrams/ArchitectureDiagram.pptx
+++ b/docs/diagrams/ArchitectureDiagram.pptx
@@ -107,7 +107,27 @@
       </a:defRPr>
     </a:lvl9pPr>
   </p:defaultTextStyle>
+  <p:extLst>
+    <p:ext uri="{EFAFB233-063F-42B5-8137-9DF3F51BA10A}">
+      <p15:sldGuideLst xmlns:p15="http://schemas.microsoft.com/office/powerpoint/2012/main">
+        <p15:guide id="1" orient="horz" pos="1488">
+          <p15:clr>
+            <a:srgbClr val="A4A3A4"/>
+          </p15:clr>
+        </p15:guide>
+        <p15:guide id="2" pos="2880">
+          <p15:clr>
+            <a:srgbClr val="A4A3A4"/>
+          </p15:clr>
+        </p15:guide>
+      </p15:sldGuideLst>
+    </p:ext>
+  </p:extLst>
 </p:presentation>
+</file>
+
+<file path=ppt/revisionInfo.xml><?xml version="1.0" encoding="utf-8"?>
+<p1510:revInfo xmlns:a="http://schemas.openxmlformats.org/drawingml/2006/main" xmlns:r="http://schemas.openxmlformats.org/officeDocument/2006/relationships" xmlns:p1510="http://schemas.microsoft.com/office/powerpoint/2015/10/main"/>
 </file>
 
 <file path=ppt/notesMasters/notesMaster1.xml><?xml version="1.0" encoding="utf-8"?>
@@ -192,7 +212,7 @@
           <a:p>
             <a:fld id="{F5CC4B3F-88C1-4FFA-B1B6-F41C21DC6924}" type="datetimeFigureOut">
               <a:rPr lang="en-US" smtClean="0"/>
-              <a:t>10/16/2016</a:t>
+              <a:t>10/18/2017</a:t>
             </a:fld>
             <a:endParaRPr lang="en-US"/>
           </a:p>
@@ -256,38 +276,37 @@
           <a:p>
             <a:pPr lvl="0"/>
             <a:r>
-              <a:rPr lang="en-US" smtClean="0"/>
+              <a:rPr lang="en-US"/>
               <a:t>Click to edit Master text styles</a:t>
             </a:r>
           </a:p>
           <a:p>
             <a:pPr lvl="1"/>
             <a:r>
-              <a:rPr lang="en-US" smtClean="0"/>
+              <a:rPr lang="en-US"/>
               <a:t>Second level</a:t>
             </a:r>
           </a:p>
           <a:p>
             <a:pPr lvl="2"/>
             <a:r>
-              <a:rPr lang="en-US" smtClean="0"/>
+              <a:rPr lang="en-US"/>
               <a:t>Third level</a:t>
             </a:r>
           </a:p>
           <a:p>
             <a:pPr lvl="3"/>
             <a:r>
-              <a:rPr lang="en-US" smtClean="0"/>
+              <a:rPr lang="en-US"/>
               <a:t>Fourth level</a:t>
             </a:r>
           </a:p>
           <a:p>
             <a:pPr lvl="4"/>
             <a:r>
-              <a:rPr lang="en-US" smtClean="0"/>
+              <a:rPr lang="en-US"/>
               <a:t>Fifth level</a:t>
             </a:r>
-            <a:endParaRPr lang="en-US"/>
           </a:p>
         </p:txBody>
       </p:sp>
@@ -498,10 +517,9 @@
           <a:lstStyle/>
           <a:p>
             <a:r>
-              <a:rPr lang="en-US" smtClean="0"/>
+              <a:rPr lang="en-US"/>
               <a:t>Click to edit Master title style</a:t>
             </a:r>
-            <a:endParaRPr lang="en-US"/>
           </a:p>
         </p:txBody>
       </p:sp>
@@ -617,10 +635,9 @@
           </a:lstStyle>
           <a:p>
             <a:r>
-              <a:rPr lang="en-US" smtClean="0"/>
+              <a:rPr lang="en-US"/>
               <a:t>Click to edit Master subtitle style</a:t>
             </a:r>
-            <a:endParaRPr lang="en-US"/>
           </a:p>
         </p:txBody>
       </p:sp>
@@ -641,7 +658,7 @@
           <a:p>
             <a:fld id="{78C97017-6FC3-485B-9764-EAC9E56C1D49}" type="datetimeFigureOut">
               <a:rPr lang="en-US" smtClean="0"/>
-              <a:t>10/16/2016</a:t>
+              <a:t>10/18/2017</a:t>
             </a:fld>
             <a:endParaRPr lang="en-US"/>
           </a:p>
@@ -735,10 +752,9 @@
           <a:lstStyle/>
           <a:p>
             <a:r>
-              <a:rPr lang="en-US" smtClean="0"/>
+              <a:rPr lang="en-US"/>
               <a:t>Click to edit Master title style</a:t>
             </a:r>
-            <a:endParaRPr lang="en-US"/>
           </a:p>
         </p:txBody>
       </p:sp>
@@ -759,38 +775,37 @@
           <a:p>
             <a:pPr lvl="0"/>
             <a:r>
-              <a:rPr lang="en-US" smtClean="0"/>
+              <a:rPr lang="en-US"/>
               <a:t>Click to edit Master text styles</a:t>
             </a:r>
           </a:p>
           <a:p>
             <a:pPr lvl="1"/>
             <a:r>
-              <a:rPr lang="en-US" smtClean="0"/>
+              <a:rPr lang="en-US"/>
               <a:t>Second level</a:t>
             </a:r>
           </a:p>
           <a:p>
             <a:pPr lvl="2"/>
             <a:r>
-              <a:rPr lang="en-US" smtClean="0"/>
+              <a:rPr lang="en-US"/>
               <a:t>Third level</a:t>
             </a:r>
           </a:p>
           <a:p>
             <a:pPr lvl="3"/>
             <a:r>
-              <a:rPr lang="en-US" smtClean="0"/>
+              <a:rPr lang="en-US"/>
               <a:t>Fourth level</a:t>
             </a:r>
           </a:p>
           <a:p>
             <a:pPr lvl="4"/>
             <a:r>
-              <a:rPr lang="en-US" smtClean="0"/>
+              <a:rPr lang="en-US"/>
               <a:t>Fifth level</a:t>
             </a:r>
-            <a:endParaRPr lang="en-US"/>
           </a:p>
         </p:txBody>
       </p:sp>
@@ -811,7 +826,7 @@
           <a:p>
             <a:fld id="{78C97017-6FC3-485B-9764-EAC9E56C1D49}" type="datetimeFigureOut">
               <a:rPr lang="en-US" smtClean="0"/>
-              <a:t>10/16/2016</a:t>
+              <a:t>10/18/2017</a:t>
             </a:fld>
             <a:endParaRPr lang="en-US"/>
           </a:p>
@@ -910,10 +925,9 @@
           <a:lstStyle/>
           <a:p>
             <a:r>
-              <a:rPr lang="en-US" smtClean="0"/>
+              <a:rPr lang="en-US"/>
               <a:t>Click to edit Master title style</a:t>
             </a:r>
-            <a:endParaRPr lang="en-US"/>
           </a:p>
         </p:txBody>
       </p:sp>
@@ -939,38 +953,37 @@
           <a:p>
             <a:pPr lvl="0"/>
             <a:r>
-              <a:rPr lang="en-US" smtClean="0"/>
+              <a:rPr lang="en-US"/>
               <a:t>Click to edit Master text styles</a:t>
             </a:r>
           </a:p>
           <a:p>
             <a:pPr lvl="1"/>
             <a:r>
-              <a:rPr lang="en-US" smtClean="0"/>
+              <a:rPr lang="en-US"/>
               <a:t>Second level</a:t>
             </a:r>
           </a:p>
           <a:p>
             <a:pPr lvl="2"/>
             <a:r>
-              <a:rPr lang="en-US" smtClean="0"/>
+              <a:rPr lang="en-US"/>
               <a:t>Third level</a:t>
             </a:r>
           </a:p>
           <a:p>
             <a:pPr lvl="3"/>
             <a:r>
-              <a:rPr lang="en-US" smtClean="0"/>
+              <a:rPr lang="en-US"/>
               <a:t>Fourth level</a:t>
             </a:r>
           </a:p>
           <a:p>
             <a:pPr lvl="4"/>
             <a:r>
-              <a:rPr lang="en-US" smtClean="0"/>
+              <a:rPr lang="en-US"/>
               <a:t>Fifth level</a:t>
             </a:r>
-            <a:endParaRPr lang="en-US"/>
           </a:p>
         </p:txBody>
       </p:sp>
@@ -991,7 +1004,7 @@
           <a:p>
             <a:fld id="{78C97017-6FC3-485B-9764-EAC9E56C1D49}" type="datetimeFigureOut">
               <a:rPr lang="en-US" smtClean="0"/>
-              <a:t>10/16/2016</a:t>
+              <a:t>10/18/2017</a:t>
             </a:fld>
             <a:endParaRPr lang="en-US"/>
           </a:p>
@@ -1085,10 +1098,9 @@
           <a:lstStyle/>
           <a:p>
             <a:r>
-              <a:rPr lang="en-US" smtClean="0"/>
+              <a:rPr lang="en-US"/>
               <a:t>Click to edit Master title style</a:t>
             </a:r>
-            <a:endParaRPr lang="en-US"/>
           </a:p>
         </p:txBody>
       </p:sp>
@@ -1109,38 +1121,37 @@
           <a:p>
             <a:pPr lvl="0"/>
             <a:r>
-              <a:rPr lang="en-US" smtClean="0"/>
+              <a:rPr lang="en-US"/>
               <a:t>Click to edit Master text styles</a:t>
             </a:r>
           </a:p>
           <a:p>
             <a:pPr lvl="1"/>
             <a:r>
-              <a:rPr lang="en-US" smtClean="0"/>
+              <a:rPr lang="en-US"/>
               <a:t>Second level</a:t>
             </a:r>
           </a:p>
           <a:p>
             <a:pPr lvl="2"/>
             <a:r>
-              <a:rPr lang="en-US" smtClean="0"/>
+              <a:rPr lang="en-US"/>
               <a:t>Third level</a:t>
             </a:r>
           </a:p>
           <a:p>
             <a:pPr lvl="3"/>
             <a:r>
-              <a:rPr lang="en-US" smtClean="0"/>
+              <a:rPr lang="en-US"/>
               <a:t>Fourth level</a:t>
             </a:r>
           </a:p>
           <a:p>
             <a:pPr lvl="4"/>
             <a:r>
-              <a:rPr lang="en-US" smtClean="0"/>
+              <a:rPr lang="en-US"/>
               <a:t>Fifth level</a:t>
             </a:r>
-            <a:endParaRPr lang="en-US"/>
           </a:p>
         </p:txBody>
       </p:sp>
@@ -1161,7 +1172,7 @@
           <a:p>
             <a:fld id="{78C97017-6FC3-485B-9764-EAC9E56C1D49}" type="datetimeFigureOut">
               <a:rPr lang="en-US" smtClean="0"/>
-              <a:t>10/16/2016</a:t>
+              <a:t>10/18/2017</a:t>
             </a:fld>
             <a:endParaRPr lang="en-US"/>
           </a:p>
@@ -1264,10 +1275,9 @@
           </a:lstStyle>
           <a:p>
             <a:r>
-              <a:rPr lang="en-US" smtClean="0"/>
+              <a:rPr lang="en-US"/>
               <a:t>Click to edit Master title style</a:t>
             </a:r>
-            <a:endParaRPr lang="en-US"/>
           </a:p>
         </p:txBody>
       </p:sp>
@@ -1384,7 +1394,7 @@
           <a:p>
             <a:pPr lvl="0"/>
             <a:r>
-              <a:rPr lang="en-US" smtClean="0"/>
+              <a:rPr lang="en-US"/>
               <a:t>Click to edit Master text styles</a:t>
             </a:r>
           </a:p>
@@ -1407,7 +1417,7 @@
           <a:p>
             <a:fld id="{78C97017-6FC3-485B-9764-EAC9E56C1D49}" type="datetimeFigureOut">
               <a:rPr lang="en-US" smtClean="0"/>
-              <a:t>10/16/2016</a:t>
+              <a:t>10/18/2017</a:t>
             </a:fld>
             <a:endParaRPr lang="en-US"/>
           </a:p>
@@ -1501,10 +1511,9 @@
           <a:lstStyle/>
           <a:p>
             <a:r>
-              <a:rPr lang="en-US" smtClean="0"/>
+              <a:rPr lang="en-US"/>
               <a:t>Click to edit Master title style</a:t>
             </a:r>
-            <a:endParaRPr lang="en-US"/>
           </a:p>
         </p:txBody>
       </p:sp>
@@ -1558,38 +1567,37 @@
           <a:p>
             <a:pPr lvl="0"/>
             <a:r>
-              <a:rPr lang="en-US" smtClean="0"/>
+              <a:rPr lang="en-US"/>
               <a:t>Click to edit Master text styles</a:t>
             </a:r>
           </a:p>
           <a:p>
             <a:pPr lvl="1"/>
             <a:r>
-              <a:rPr lang="en-US" smtClean="0"/>
+              <a:rPr lang="en-US"/>
               <a:t>Second level</a:t>
             </a:r>
           </a:p>
           <a:p>
             <a:pPr lvl="2"/>
             <a:r>
-              <a:rPr lang="en-US" smtClean="0"/>
+              <a:rPr lang="en-US"/>
               <a:t>Third level</a:t>
             </a:r>
           </a:p>
           <a:p>
             <a:pPr lvl="3"/>
             <a:r>
-              <a:rPr lang="en-US" smtClean="0"/>
+              <a:rPr lang="en-US"/>
               <a:t>Fourth level</a:t>
             </a:r>
           </a:p>
           <a:p>
             <a:pPr lvl="4"/>
             <a:r>
-              <a:rPr lang="en-US" smtClean="0"/>
+              <a:rPr lang="en-US"/>
               <a:t>Fifth level</a:t>
             </a:r>
-            <a:endParaRPr lang="en-US"/>
           </a:p>
         </p:txBody>
       </p:sp>
@@ -1643,38 +1651,37 @@
           <a:p>
             <a:pPr lvl="0"/>
             <a:r>
-              <a:rPr lang="en-US" smtClean="0"/>
+              <a:rPr lang="en-US"/>
               <a:t>Click to edit Master text styles</a:t>
             </a:r>
           </a:p>
           <a:p>
             <a:pPr lvl="1"/>
             <a:r>
-              <a:rPr lang="en-US" smtClean="0"/>
+              <a:rPr lang="en-US"/>
               <a:t>Second level</a:t>
             </a:r>
           </a:p>
           <a:p>
             <a:pPr lvl="2"/>
             <a:r>
-              <a:rPr lang="en-US" smtClean="0"/>
+              <a:rPr lang="en-US"/>
               <a:t>Third level</a:t>
             </a:r>
           </a:p>
           <a:p>
             <a:pPr lvl="3"/>
             <a:r>
-              <a:rPr lang="en-US" smtClean="0"/>
+              <a:rPr lang="en-US"/>
               <a:t>Fourth level</a:t>
             </a:r>
           </a:p>
           <a:p>
             <a:pPr lvl="4"/>
             <a:r>
-              <a:rPr lang="en-US" smtClean="0"/>
+              <a:rPr lang="en-US"/>
               <a:t>Fifth level</a:t>
             </a:r>
-            <a:endParaRPr lang="en-US"/>
           </a:p>
         </p:txBody>
       </p:sp>
@@ -1695,7 +1702,7 @@
           <a:p>
             <a:fld id="{78C97017-6FC3-485B-9764-EAC9E56C1D49}" type="datetimeFigureOut">
               <a:rPr lang="en-US" smtClean="0"/>
-              <a:t>10/16/2016</a:t>
+              <a:t>10/18/2017</a:t>
             </a:fld>
             <a:endParaRPr lang="en-US"/>
           </a:p>
@@ -1793,10 +1800,9 @@
           </a:lstStyle>
           <a:p>
             <a:r>
-              <a:rPr lang="en-US" smtClean="0"/>
+              <a:rPr lang="en-US"/>
               <a:t>Click to edit Master title style</a:t>
             </a:r>
-            <a:endParaRPr lang="en-US"/>
           </a:p>
         </p:txBody>
       </p:sp>
@@ -1859,7 +1865,7 @@
           <a:p>
             <a:pPr lvl="0"/>
             <a:r>
-              <a:rPr lang="en-US" smtClean="0"/>
+              <a:rPr lang="en-US"/>
               <a:t>Click to edit Master text styles</a:t>
             </a:r>
           </a:p>
@@ -1915,38 +1921,37 @@
           <a:p>
             <a:pPr lvl="0"/>
             <a:r>
-              <a:rPr lang="en-US" smtClean="0"/>
+              <a:rPr lang="en-US"/>
               <a:t>Click to edit Master text styles</a:t>
             </a:r>
           </a:p>
           <a:p>
             <a:pPr lvl="1"/>
             <a:r>
-              <a:rPr lang="en-US" smtClean="0"/>
+              <a:rPr lang="en-US"/>
               <a:t>Second level</a:t>
             </a:r>
           </a:p>
           <a:p>
             <a:pPr lvl="2"/>
             <a:r>
-              <a:rPr lang="en-US" smtClean="0"/>
+              <a:rPr lang="en-US"/>
               <a:t>Third level</a:t>
             </a:r>
           </a:p>
           <a:p>
             <a:pPr lvl="3"/>
             <a:r>
-              <a:rPr lang="en-US" smtClean="0"/>
+              <a:rPr lang="en-US"/>
               <a:t>Fourth level</a:t>
             </a:r>
           </a:p>
           <a:p>
             <a:pPr lvl="4"/>
             <a:r>
-              <a:rPr lang="en-US" smtClean="0"/>
+              <a:rPr lang="en-US"/>
               <a:t>Fifth level</a:t>
             </a:r>
-            <a:endParaRPr lang="en-US"/>
           </a:p>
         </p:txBody>
       </p:sp>
@@ -2009,7 +2014,7 @@
           <a:p>
             <a:pPr lvl="0"/>
             <a:r>
-              <a:rPr lang="en-US" smtClean="0"/>
+              <a:rPr lang="en-US"/>
               <a:t>Click to edit Master text styles</a:t>
             </a:r>
           </a:p>
@@ -2065,38 +2070,37 @@
           <a:p>
             <a:pPr lvl="0"/>
             <a:r>
-              <a:rPr lang="en-US" smtClean="0"/>
+              <a:rPr lang="en-US"/>
               <a:t>Click to edit Master text styles</a:t>
             </a:r>
           </a:p>
           <a:p>
             <a:pPr lvl="1"/>
             <a:r>
-              <a:rPr lang="en-US" smtClean="0"/>
+              <a:rPr lang="en-US"/>
               <a:t>Second level</a:t>
             </a:r>
           </a:p>
           <a:p>
             <a:pPr lvl="2"/>
             <a:r>
-              <a:rPr lang="en-US" smtClean="0"/>
+              <a:rPr lang="en-US"/>
               <a:t>Third level</a:t>
             </a:r>
           </a:p>
           <a:p>
             <a:pPr lvl="3"/>
             <a:r>
-              <a:rPr lang="en-US" smtClean="0"/>
+              <a:rPr lang="en-US"/>
               <a:t>Fourth level</a:t>
             </a:r>
           </a:p>
           <a:p>
             <a:pPr lvl="4"/>
             <a:r>
-              <a:rPr lang="en-US" smtClean="0"/>
+              <a:rPr lang="en-US"/>
               <a:t>Fifth level</a:t>
             </a:r>
-            <a:endParaRPr lang="en-US"/>
           </a:p>
         </p:txBody>
       </p:sp>
@@ -2117,7 +2121,7 @@
           <a:p>
             <a:fld id="{78C97017-6FC3-485B-9764-EAC9E56C1D49}" type="datetimeFigureOut">
               <a:rPr lang="en-US" smtClean="0"/>
-              <a:t>10/16/2016</a:t>
+              <a:t>10/18/2017</a:t>
             </a:fld>
             <a:endParaRPr lang="en-US"/>
           </a:p>
@@ -2211,10 +2215,9 @@
           <a:lstStyle/>
           <a:p>
             <a:r>
-              <a:rPr lang="en-US" smtClean="0"/>
+              <a:rPr lang="en-US"/>
               <a:t>Click to edit Master title style</a:t>
             </a:r>
-            <a:endParaRPr lang="en-US"/>
           </a:p>
         </p:txBody>
       </p:sp>
@@ -2235,7 +2238,7 @@
           <a:p>
             <a:fld id="{78C97017-6FC3-485B-9764-EAC9E56C1D49}" type="datetimeFigureOut">
               <a:rPr lang="en-US" smtClean="0"/>
-              <a:t>10/16/2016</a:t>
+              <a:t>10/18/2017</a:t>
             </a:fld>
             <a:endParaRPr lang="en-US"/>
           </a:p>
@@ -2330,7 +2333,7 @@
           <a:p>
             <a:fld id="{78C97017-6FC3-485B-9764-EAC9E56C1D49}" type="datetimeFigureOut">
               <a:rPr lang="en-US" smtClean="0"/>
-              <a:t>10/16/2016</a:t>
+              <a:t>10/18/2017</a:t>
             </a:fld>
             <a:endParaRPr lang="en-US"/>
           </a:p>
@@ -2433,10 +2436,9 @@
           </a:lstStyle>
           <a:p>
             <a:r>
-              <a:rPr lang="en-US" smtClean="0"/>
+              <a:rPr lang="en-US"/>
               <a:t>Click to edit Master title style</a:t>
             </a:r>
-            <a:endParaRPr lang="en-US"/>
           </a:p>
         </p:txBody>
       </p:sp>
@@ -2490,38 +2492,37 @@
           <a:p>
             <a:pPr lvl="0"/>
             <a:r>
-              <a:rPr lang="en-US" smtClean="0"/>
+              <a:rPr lang="en-US"/>
               <a:t>Click to edit Master text styles</a:t>
             </a:r>
           </a:p>
           <a:p>
             <a:pPr lvl="1"/>
             <a:r>
-              <a:rPr lang="en-US" smtClean="0"/>
+              <a:rPr lang="en-US"/>
               <a:t>Second level</a:t>
             </a:r>
           </a:p>
           <a:p>
             <a:pPr lvl="2"/>
             <a:r>
-              <a:rPr lang="en-US" smtClean="0"/>
+              <a:rPr lang="en-US"/>
               <a:t>Third level</a:t>
             </a:r>
           </a:p>
           <a:p>
             <a:pPr lvl="3"/>
             <a:r>
-              <a:rPr lang="en-US" smtClean="0"/>
+              <a:rPr lang="en-US"/>
               <a:t>Fourth level</a:t>
             </a:r>
           </a:p>
           <a:p>
             <a:pPr lvl="4"/>
             <a:r>
-              <a:rPr lang="en-US" smtClean="0"/>
+              <a:rPr lang="en-US"/>
               <a:t>Fifth level</a:t>
             </a:r>
-            <a:endParaRPr lang="en-US"/>
           </a:p>
         </p:txBody>
       </p:sp>
@@ -2584,7 +2585,7 @@
           <a:p>
             <a:pPr lvl="0"/>
             <a:r>
-              <a:rPr lang="en-US" smtClean="0"/>
+              <a:rPr lang="en-US"/>
               <a:t>Click to edit Master text styles</a:t>
             </a:r>
           </a:p>
@@ -2607,7 +2608,7 @@
           <a:p>
             <a:fld id="{78C97017-6FC3-485B-9764-EAC9E56C1D49}" type="datetimeFigureOut">
               <a:rPr lang="en-US" smtClean="0"/>
-              <a:t>10/16/2016</a:t>
+              <a:t>10/18/2017</a:t>
             </a:fld>
             <a:endParaRPr lang="en-US"/>
           </a:p>
@@ -2710,10 +2711,9 @@
           </a:lstStyle>
           <a:p>
             <a:r>
-              <a:rPr lang="en-US" smtClean="0"/>
+              <a:rPr lang="en-US"/>
               <a:t>Click to edit Master title style</a:t>
             </a:r>
-            <a:endParaRPr lang="en-US"/>
           </a:p>
         </p:txBody>
       </p:sp>
@@ -2837,7 +2837,7 @@
           <a:p>
             <a:pPr lvl="0"/>
             <a:r>
-              <a:rPr lang="en-US" smtClean="0"/>
+              <a:rPr lang="en-US"/>
               <a:t>Click to edit Master text styles</a:t>
             </a:r>
           </a:p>
@@ -2860,7 +2860,7 @@
           <a:p>
             <a:fld id="{78C97017-6FC3-485B-9764-EAC9E56C1D49}" type="datetimeFigureOut">
               <a:rPr lang="en-US" smtClean="0"/>
-              <a:t>10/16/2016</a:t>
+              <a:t>10/18/2017</a:t>
             </a:fld>
             <a:endParaRPr lang="en-US"/>
           </a:p>
@@ -2969,10 +2969,9 @@
           <a:lstStyle/>
           <a:p>
             <a:r>
-              <a:rPr lang="en-US" smtClean="0"/>
+              <a:rPr lang="en-US"/>
               <a:t>Click to edit Master title style</a:t>
             </a:r>
-            <a:endParaRPr lang="en-US"/>
           </a:p>
         </p:txBody>
       </p:sp>
@@ -3003,38 +3002,37 @@
           <a:p>
             <a:pPr lvl="0"/>
             <a:r>
-              <a:rPr lang="en-US" smtClean="0"/>
+              <a:rPr lang="en-US"/>
               <a:t>Click to edit Master text styles</a:t>
             </a:r>
           </a:p>
           <a:p>
             <a:pPr lvl="1"/>
             <a:r>
-              <a:rPr lang="en-US" smtClean="0"/>
+              <a:rPr lang="en-US"/>
               <a:t>Second level</a:t>
             </a:r>
           </a:p>
           <a:p>
             <a:pPr lvl="2"/>
             <a:r>
-              <a:rPr lang="en-US" smtClean="0"/>
+              <a:rPr lang="en-US"/>
               <a:t>Third level</a:t>
             </a:r>
           </a:p>
           <a:p>
             <a:pPr lvl="3"/>
             <a:r>
-              <a:rPr lang="en-US" smtClean="0"/>
+              <a:rPr lang="en-US"/>
               <a:t>Fourth level</a:t>
             </a:r>
           </a:p>
           <a:p>
             <a:pPr lvl="4"/>
             <a:r>
-              <a:rPr lang="en-US" smtClean="0"/>
+              <a:rPr lang="en-US"/>
               <a:t>Fifth level</a:t>
             </a:r>
-            <a:endParaRPr lang="en-US"/>
           </a:p>
         </p:txBody>
       </p:sp>
@@ -3073,7 +3071,7 @@
           <a:p>
             <a:fld id="{78C97017-6FC3-485B-9764-EAC9E56C1D49}" type="datetimeFigureOut">
               <a:rPr lang="en-US" smtClean="0"/>
-              <a:t>10/16/2016</a:t>
+              <a:t>10/18/2017</a:t>
             </a:fld>
             <a:endParaRPr lang="en-US"/>
           </a:p>
@@ -3456,8 +3454,8 @@
         </p:nvSpPr>
         <p:spPr>
           <a:xfrm>
-            <a:off x="1636188" y="2057400"/>
-            <a:ext cx="5700181" cy="2667000"/>
+            <a:off x="1636188" y="457200"/>
+            <a:ext cx="5700181" cy="4267200"/>
           </a:xfrm>
           <a:prstGeom prst="roundRect">
             <a:avLst>
@@ -3546,7 +3544,7 @@
           <a:p>
             <a:pPr algn="ctr"/>
             <a:r>
-              <a:rPr lang="en-US" sz="1600" dirty="0" smtClean="0">
+              <a:rPr lang="en-US" sz="1600" dirty="0">
                 <a:solidFill>
                   <a:schemeClr val="bg1"/>
                 </a:solidFill>
@@ -3605,7 +3603,7 @@
           <a:p>
             <a:pPr algn="ctr"/>
             <a:r>
-              <a:rPr lang="en-US" sz="1600" dirty="0" smtClean="0">
+              <a:rPr lang="en-US" sz="1600" dirty="0">
                 <a:solidFill>
                   <a:schemeClr val="bg1"/>
                 </a:solidFill>
@@ -3668,7 +3666,7 @@
           <a:p>
             <a:pPr algn="ctr"/>
             <a:r>
-              <a:rPr lang="en-US" sz="1600" dirty="0" smtClean="0">
+              <a:rPr lang="en-US" sz="1600" dirty="0">
                 <a:solidFill>
                   <a:schemeClr val="bg1"/>
                 </a:solidFill>
@@ -3727,7 +3725,7 @@
           <a:p>
             <a:pPr algn="ctr"/>
             <a:r>
-              <a:rPr lang="en-US" sz="1600" dirty="0" smtClean="0">
+              <a:rPr lang="en-US" sz="1600" dirty="0">
                 <a:solidFill>
                   <a:schemeClr val="bg1"/>
                 </a:solidFill>
@@ -4182,7 +4180,7 @@
         </p:nvSpPr>
         <p:spPr>
           <a:xfrm>
-            <a:off x="2650069" y="1447800"/>
+            <a:off x="1964269" y="1049649"/>
             <a:ext cx="914400" cy="533400"/>
           </a:xfrm>
           <a:prstGeom prst="cloud">
@@ -4239,12 +4237,15 @@
           <p:nvPr/>
         </p:nvCxnSpPr>
         <p:spPr>
-          <a:xfrm rot="5400000" flipH="1" flipV="1">
-            <a:off x="2222648" y="1760922"/>
-            <a:ext cx="476678" cy="383835"/>
-          </a:xfrm>
-          <a:prstGeom prst="bentConnector2">
-            <a:avLst/>
+          <a:xfrm rot="16200000" flipV="1">
+            <a:off x="1680674" y="1602781"/>
+            <a:ext cx="874829" cy="301965"/>
+          </a:xfrm>
+          <a:prstGeom prst="bentConnector4">
+            <a:avLst>
+              <a:gd name="adj1" fmla="val 34757"/>
+              <a:gd name="adj2" fmla="val 176643"/>
+            </a:avLst>
           </a:prstGeom>
           <a:ln w="28575">
             <a:solidFill>
@@ -4313,7 +4314,7 @@
           <a:p>
             <a:pPr algn="ctr"/>
             <a:r>
-              <a:rPr lang="en-US" sz="1600" dirty="0" smtClean="0">
+              <a:rPr lang="en-US" sz="1600" dirty="0">
                 <a:solidFill>
                   <a:schemeClr val="bg1"/>
                 </a:solidFill>
@@ -4664,7 +4665,7 @@
           <a:p>
             <a:pPr algn="ctr"/>
             <a:r>
-              <a:rPr lang="en-US" sz="1600" dirty="0" smtClean="0">
+              <a:rPr lang="en-US" sz="1600" dirty="0">
                 <a:solidFill>
                   <a:schemeClr val="bg1"/>
                 </a:solidFill>
@@ -4672,25 +4673,20 @@
               <a:t>Logs</a:t>
             </a:r>
             <a:br>
-              <a:rPr lang="en-US" sz="1600" dirty="0" smtClean="0">
+              <a:rPr lang="en-US" sz="1600" dirty="0">
                 <a:solidFill>
                   <a:schemeClr val="bg1"/>
                 </a:solidFill>
               </a:rPr>
             </a:br>
             <a:r>
-              <a:rPr lang="en-US" sz="1600" dirty="0" smtClean="0">
+              <a:rPr lang="en-US" sz="1600" dirty="0">
                 <a:solidFill>
                   <a:schemeClr val="bg1"/>
                 </a:solidFill>
               </a:rPr>
               <a:t>Center</a:t>
             </a:r>
-            <a:endParaRPr lang="en-US" sz="1600" dirty="0">
-              <a:solidFill>
-                <a:schemeClr val="bg1"/>
-              </a:solidFill>
-            </a:endParaRPr>
           </a:p>
         </p:txBody>
       </p:sp>
@@ -4773,6 +4769,221 @@
           </a:fontRef>
         </p:style>
       </p:cxnSp>
+      <p:sp>
+        <p:nvSpPr>
+          <p:cNvPr id="42" name="Rectangle 45">
+            <a:extLst>
+              <a:ext uri="{FF2B5EF4-FFF2-40B4-BE49-F238E27FC236}">
+                <a16:creationId xmlns:a16="http://schemas.microsoft.com/office/drawing/2014/main" id="{0F2D5BDB-5133-4D5C-84DC-E48CDA3265B1}"/>
+              </a:ext>
+            </a:extLst>
+          </p:cNvPr>
+          <p:cNvSpPr/>
+          <p:nvPr/>
+        </p:nvSpPr>
+        <p:spPr>
+          <a:xfrm>
+            <a:off x="3398959" y="790789"/>
+            <a:ext cx="1295400" cy="552022"/>
+          </a:xfrm>
+          <a:prstGeom prst="roundRect">
+            <a:avLst/>
+          </a:prstGeom>
+          <a:solidFill>
+            <a:srgbClr val="FFC000"/>
+          </a:solidFill>
+          <a:ln w="19050">
+            <a:solidFill>
+              <a:srgbClr val="FFC000"/>
+            </a:solidFill>
+          </a:ln>
+          <a:effectLst/>
+        </p:spPr>
+        <p:style>
+          <a:lnRef idx="1">
+            <a:schemeClr val="accent5"/>
+          </a:lnRef>
+          <a:fillRef idx="2">
+            <a:schemeClr val="accent5"/>
+          </a:fillRef>
+          <a:effectRef idx="1">
+            <a:schemeClr val="accent5"/>
+          </a:effectRef>
+          <a:fontRef idx="minor">
+            <a:schemeClr val="dk1"/>
+          </a:fontRef>
+        </p:style>
+        <p:txBody>
+          <a:bodyPr rtlCol="0" anchor="ctr"/>
+          <a:lstStyle/>
+          <a:p>
+            <a:pPr algn="ctr"/>
+            <a:r>
+              <a:rPr lang="en-US" sz="1600">
+                <a:solidFill>
+                  <a:schemeClr val="bg1"/>
+                </a:solidFill>
+              </a:rPr>
+              <a:t>Email</a:t>
+            </a:r>
+            <a:endParaRPr lang="en-SG" sz="1600" dirty="0">
+              <a:solidFill>
+                <a:schemeClr val="bg1"/>
+              </a:solidFill>
+            </a:endParaRPr>
+          </a:p>
+        </p:txBody>
+      </p:sp>
+      <p:cxnSp>
+        <p:nvCxnSpPr>
+          <p:cNvPr id="43" name="Straight Arrow Connector 42">
+            <a:extLst>
+              <a:ext uri="{FF2B5EF4-FFF2-40B4-BE49-F238E27FC236}">
+                <a16:creationId xmlns:a16="http://schemas.microsoft.com/office/drawing/2014/main" id="{1BF00FD0-5D3A-4E81-A58B-14FF22351161}"/>
+              </a:ext>
+            </a:extLst>
+          </p:cNvPr>
+          <p:cNvCxnSpPr>
+            <a:cxnSpLocks/>
+          </p:cNvCxnSpPr>
+          <p:nvPr/>
+        </p:nvCxnSpPr>
+        <p:spPr>
+          <a:xfrm>
+            <a:off x="4046659" y="1342811"/>
+            <a:ext cx="13110" cy="848367"/>
+          </a:xfrm>
+          <a:prstGeom prst="straightConnector1">
+            <a:avLst/>
+          </a:prstGeom>
+          <a:ln w="28575">
+            <a:solidFill>
+              <a:srgbClr val="FFC000"/>
+            </a:solidFill>
+            <a:tailEnd type="arrow"/>
+          </a:ln>
+        </p:spPr>
+        <p:style>
+          <a:lnRef idx="1">
+            <a:schemeClr val="accent1"/>
+          </a:lnRef>
+          <a:fillRef idx="0">
+            <a:schemeClr val="accent1"/>
+          </a:fillRef>
+          <a:effectRef idx="0">
+            <a:schemeClr val="accent1"/>
+          </a:effectRef>
+          <a:fontRef idx="minor">
+            <a:schemeClr val="tx1"/>
+          </a:fontRef>
+        </p:style>
+      </p:cxnSp>
+      <p:cxnSp>
+        <p:nvCxnSpPr>
+          <p:cNvPr id="44" name="Straight Arrow Connector 43">
+            <a:extLst>
+              <a:ext uri="{FF2B5EF4-FFF2-40B4-BE49-F238E27FC236}">
+                <a16:creationId xmlns:a16="http://schemas.microsoft.com/office/drawing/2014/main" id="{1CCC4800-6450-4053-865A-EC2694C77CBB}"/>
+              </a:ext>
+            </a:extLst>
+          </p:cNvPr>
+          <p:cNvCxnSpPr>
+            <a:cxnSpLocks/>
+          </p:cNvCxnSpPr>
+          <p:nvPr/>
+        </p:nvCxnSpPr>
+        <p:spPr>
+          <a:xfrm flipV="1">
+            <a:off x="4694359" y="1049650"/>
+            <a:ext cx="520290" cy="1"/>
+          </a:xfrm>
+          <a:prstGeom prst="straightConnector1">
+            <a:avLst/>
+          </a:prstGeom>
+          <a:ln w="28575">
+            <a:solidFill>
+              <a:srgbClr val="FFC000"/>
+            </a:solidFill>
+            <a:prstDash val="sysDot"/>
+            <a:tailEnd type="arrow"/>
+          </a:ln>
+        </p:spPr>
+        <p:style>
+          <a:lnRef idx="1">
+            <a:schemeClr val="accent1"/>
+          </a:lnRef>
+          <a:fillRef idx="0">
+            <a:schemeClr val="accent1"/>
+          </a:fillRef>
+          <a:effectRef idx="0">
+            <a:schemeClr val="accent1"/>
+          </a:effectRef>
+          <a:fontRef idx="minor">
+            <a:schemeClr val="tx1"/>
+          </a:fontRef>
+        </p:style>
+      </p:cxnSp>
+      <p:sp>
+        <p:nvSpPr>
+          <p:cNvPr id="45" name="Cloud 44">
+            <a:extLst>
+              <a:ext uri="{FF2B5EF4-FFF2-40B4-BE49-F238E27FC236}">
+                <a16:creationId xmlns:a16="http://schemas.microsoft.com/office/drawing/2014/main" id="{020644C7-8E1D-48ED-98EB-C7FBB9506C13}"/>
+              </a:ext>
+            </a:extLst>
+          </p:cNvPr>
+          <p:cNvSpPr/>
+          <p:nvPr/>
+        </p:nvSpPr>
+        <p:spPr>
+          <a:xfrm>
+            <a:off x="5249847" y="573239"/>
+            <a:ext cx="1464732" cy="987122"/>
+          </a:xfrm>
+          <a:prstGeom prst="cloud">
+            <a:avLst/>
+          </a:prstGeom>
+          <a:solidFill>
+            <a:schemeClr val="bg1"/>
+          </a:solidFill>
+          <a:ln>
+            <a:solidFill>
+              <a:schemeClr val="tx1"/>
+            </a:solidFill>
+          </a:ln>
+        </p:spPr>
+        <p:style>
+          <a:lnRef idx="2">
+            <a:schemeClr val="accent1">
+              <a:shade val="50000"/>
+            </a:schemeClr>
+          </a:lnRef>
+          <a:fillRef idx="1">
+            <a:schemeClr val="accent1"/>
+          </a:fillRef>
+          <a:effectRef idx="0">
+            <a:schemeClr val="accent1"/>
+          </a:effectRef>
+          <a:fontRef idx="minor">
+            <a:schemeClr val="lt1"/>
+          </a:fontRef>
+        </p:style>
+        <p:txBody>
+          <a:bodyPr rtlCol="0" anchor="ctr"/>
+          <a:lstStyle/>
+          <a:p>
+            <a:pPr algn="ctr"/>
+            <a:r>
+              <a:rPr lang="en-US" sz="1400" dirty="0">
+                <a:solidFill>
+                  <a:schemeClr val="tx1"/>
+                </a:solidFill>
+              </a:rPr>
+              <a:t>Email Server</a:t>
+            </a:r>
+          </a:p>
+        </p:txBody>
+      </p:sp>
     </p:spTree>
     <p:extLst>
       <p:ext uri="{BB962C8B-B14F-4D97-AF65-F5344CB8AC3E}">

</xml_diff>

<commit_message>
Update diagrams for appointment
</commit_message>
<xml_diff>
--- a/docs/diagrams/ArchitectureDiagram.pptx
+++ b/docs/diagrams/ArchitectureDiagram.pptx
@@ -107,7 +107,27 @@
       </a:defRPr>
     </a:lvl9pPr>
   </p:defaultTextStyle>
+  <p:extLst>
+    <p:ext uri="{EFAFB233-063F-42B5-8137-9DF3F51BA10A}">
+      <p15:sldGuideLst xmlns:p15="http://schemas.microsoft.com/office/powerpoint/2012/main">
+        <p15:guide id="1" orient="horz" pos="1488">
+          <p15:clr>
+            <a:srgbClr val="A4A3A4"/>
+          </p15:clr>
+        </p15:guide>
+        <p15:guide id="2" pos="2880">
+          <p15:clr>
+            <a:srgbClr val="A4A3A4"/>
+          </p15:clr>
+        </p15:guide>
+      </p15:sldGuideLst>
+    </p:ext>
+  </p:extLst>
 </p:presentation>
+</file>
+
+<file path=ppt/revisionInfo.xml><?xml version="1.0" encoding="utf-8"?>
+<p1510:revInfo xmlns:a="http://schemas.openxmlformats.org/drawingml/2006/main" xmlns:r="http://schemas.openxmlformats.org/officeDocument/2006/relationships" xmlns:p1510="http://schemas.microsoft.com/office/powerpoint/2015/10/main"/>
 </file>
 
 <file path=ppt/notesMasters/notesMaster1.xml><?xml version="1.0" encoding="utf-8"?>
@@ -192,7 +212,7 @@
           <a:p>
             <a:fld id="{F5CC4B3F-88C1-4FFA-B1B6-F41C21DC6924}" type="datetimeFigureOut">
               <a:rPr lang="en-US" smtClean="0"/>
-              <a:t>10/16/2016</a:t>
+              <a:t>10/29/2017</a:t>
             </a:fld>
             <a:endParaRPr lang="en-US"/>
           </a:p>
@@ -256,38 +276,37 @@
           <a:p>
             <a:pPr lvl="0"/>
             <a:r>
-              <a:rPr lang="en-US" smtClean="0"/>
+              <a:rPr lang="en-US"/>
               <a:t>Click to edit Master text styles</a:t>
             </a:r>
           </a:p>
           <a:p>
             <a:pPr lvl="1"/>
             <a:r>
-              <a:rPr lang="en-US" smtClean="0"/>
+              <a:rPr lang="en-US"/>
               <a:t>Second level</a:t>
             </a:r>
           </a:p>
           <a:p>
             <a:pPr lvl="2"/>
             <a:r>
-              <a:rPr lang="en-US" smtClean="0"/>
+              <a:rPr lang="en-US"/>
               <a:t>Third level</a:t>
             </a:r>
           </a:p>
           <a:p>
             <a:pPr lvl="3"/>
             <a:r>
-              <a:rPr lang="en-US" smtClean="0"/>
+              <a:rPr lang="en-US"/>
               <a:t>Fourth level</a:t>
             </a:r>
           </a:p>
           <a:p>
             <a:pPr lvl="4"/>
             <a:r>
-              <a:rPr lang="en-US" smtClean="0"/>
+              <a:rPr lang="en-US"/>
               <a:t>Fifth level</a:t>
             </a:r>
-            <a:endParaRPr lang="en-US"/>
           </a:p>
         </p:txBody>
       </p:sp>
@@ -498,10 +517,9 @@
           <a:lstStyle/>
           <a:p>
             <a:r>
-              <a:rPr lang="en-US" smtClean="0"/>
+              <a:rPr lang="en-US"/>
               <a:t>Click to edit Master title style</a:t>
             </a:r>
-            <a:endParaRPr lang="en-US"/>
           </a:p>
         </p:txBody>
       </p:sp>
@@ -617,10 +635,9 @@
           </a:lstStyle>
           <a:p>
             <a:r>
-              <a:rPr lang="en-US" smtClean="0"/>
+              <a:rPr lang="en-US"/>
               <a:t>Click to edit Master subtitle style</a:t>
             </a:r>
-            <a:endParaRPr lang="en-US"/>
           </a:p>
         </p:txBody>
       </p:sp>
@@ -641,7 +658,7 @@
           <a:p>
             <a:fld id="{78C97017-6FC3-485B-9764-EAC9E56C1D49}" type="datetimeFigureOut">
               <a:rPr lang="en-US" smtClean="0"/>
-              <a:t>10/16/2016</a:t>
+              <a:t>10/29/2017</a:t>
             </a:fld>
             <a:endParaRPr lang="en-US"/>
           </a:p>
@@ -735,10 +752,9 @@
           <a:lstStyle/>
           <a:p>
             <a:r>
-              <a:rPr lang="en-US" smtClean="0"/>
+              <a:rPr lang="en-US"/>
               <a:t>Click to edit Master title style</a:t>
             </a:r>
-            <a:endParaRPr lang="en-US"/>
           </a:p>
         </p:txBody>
       </p:sp>
@@ -759,38 +775,37 @@
           <a:p>
             <a:pPr lvl="0"/>
             <a:r>
-              <a:rPr lang="en-US" smtClean="0"/>
+              <a:rPr lang="en-US"/>
               <a:t>Click to edit Master text styles</a:t>
             </a:r>
           </a:p>
           <a:p>
             <a:pPr lvl="1"/>
             <a:r>
-              <a:rPr lang="en-US" smtClean="0"/>
+              <a:rPr lang="en-US"/>
               <a:t>Second level</a:t>
             </a:r>
           </a:p>
           <a:p>
             <a:pPr lvl="2"/>
             <a:r>
-              <a:rPr lang="en-US" smtClean="0"/>
+              <a:rPr lang="en-US"/>
               <a:t>Third level</a:t>
             </a:r>
           </a:p>
           <a:p>
             <a:pPr lvl="3"/>
             <a:r>
-              <a:rPr lang="en-US" smtClean="0"/>
+              <a:rPr lang="en-US"/>
               <a:t>Fourth level</a:t>
             </a:r>
           </a:p>
           <a:p>
             <a:pPr lvl="4"/>
             <a:r>
-              <a:rPr lang="en-US" smtClean="0"/>
+              <a:rPr lang="en-US"/>
               <a:t>Fifth level</a:t>
             </a:r>
-            <a:endParaRPr lang="en-US"/>
           </a:p>
         </p:txBody>
       </p:sp>
@@ -811,7 +826,7 @@
           <a:p>
             <a:fld id="{78C97017-6FC3-485B-9764-EAC9E56C1D49}" type="datetimeFigureOut">
               <a:rPr lang="en-US" smtClean="0"/>
-              <a:t>10/16/2016</a:t>
+              <a:t>10/29/2017</a:t>
             </a:fld>
             <a:endParaRPr lang="en-US"/>
           </a:p>
@@ -910,10 +925,9 @@
           <a:lstStyle/>
           <a:p>
             <a:r>
-              <a:rPr lang="en-US" smtClean="0"/>
+              <a:rPr lang="en-US"/>
               <a:t>Click to edit Master title style</a:t>
             </a:r>
-            <a:endParaRPr lang="en-US"/>
           </a:p>
         </p:txBody>
       </p:sp>
@@ -939,38 +953,37 @@
           <a:p>
             <a:pPr lvl="0"/>
             <a:r>
-              <a:rPr lang="en-US" smtClean="0"/>
+              <a:rPr lang="en-US"/>
               <a:t>Click to edit Master text styles</a:t>
             </a:r>
           </a:p>
           <a:p>
             <a:pPr lvl="1"/>
             <a:r>
-              <a:rPr lang="en-US" smtClean="0"/>
+              <a:rPr lang="en-US"/>
               <a:t>Second level</a:t>
             </a:r>
           </a:p>
           <a:p>
             <a:pPr lvl="2"/>
             <a:r>
-              <a:rPr lang="en-US" smtClean="0"/>
+              <a:rPr lang="en-US"/>
               <a:t>Third level</a:t>
             </a:r>
           </a:p>
           <a:p>
             <a:pPr lvl="3"/>
             <a:r>
-              <a:rPr lang="en-US" smtClean="0"/>
+              <a:rPr lang="en-US"/>
               <a:t>Fourth level</a:t>
             </a:r>
           </a:p>
           <a:p>
             <a:pPr lvl="4"/>
             <a:r>
-              <a:rPr lang="en-US" smtClean="0"/>
+              <a:rPr lang="en-US"/>
               <a:t>Fifth level</a:t>
             </a:r>
-            <a:endParaRPr lang="en-US"/>
           </a:p>
         </p:txBody>
       </p:sp>
@@ -991,7 +1004,7 @@
           <a:p>
             <a:fld id="{78C97017-6FC3-485B-9764-EAC9E56C1D49}" type="datetimeFigureOut">
               <a:rPr lang="en-US" smtClean="0"/>
-              <a:t>10/16/2016</a:t>
+              <a:t>10/29/2017</a:t>
             </a:fld>
             <a:endParaRPr lang="en-US"/>
           </a:p>
@@ -1085,10 +1098,9 @@
           <a:lstStyle/>
           <a:p>
             <a:r>
-              <a:rPr lang="en-US" smtClean="0"/>
+              <a:rPr lang="en-US"/>
               <a:t>Click to edit Master title style</a:t>
             </a:r>
-            <a:endParaRPr lang="en-US"/>
           </a:p>
         </p:txBody>
       </p:sp>
@@ -1109,38 +1121,37 @@
           <a:p>
             <a:pPr lvl="0"/>
             <a:r>
-              <a:rPr lang="en-US" smtClean="0"/>
+              <a:rPr lang="en-US"/>
               <a:t>Click to edit Master text styles</a:t>
             </a:r>
           </a:p>
           <a:p>
             <a:pPr lvl="1"/>
             <a:r>
-              <a:rPr lang="en-US" smtClean="0"/>
+              <a:rPr lang="en-US"/>
               <a:t>Second level</a:t>
             </a:r>
           </a:p>
           <a:p>
             <a:pPr lvl="2"/>
             <a:r>
-              <a:rPr lang="en-US" smtClean="0"/>
+              <a:rPr lang="en-US"/>
               <a:t>Third level</a:t>
             </a:r>
           </a:p>
           <a:p>
             <a:pPr lvl="3"/>
             <a:r>
-              <a:rPr lang="en-US" smtClean="0"/>
+              <a:rPr lang="en-US"/>
               <a:t>Fourth level</a:t>
             </a:r>
           </a:p>
           <a:p>
             <a:pPr lvl="4"/>
             <a:r>
-              <a:rPr lang="en-US" smtClean="0"/>
+              <a:rPr lang="en-US"/>
               <a:t>Fifth level</a:t>
             </a:r>
-            <a:endParaRPr lang="en-US"/>
           </a:p>
         </p:txBody>
       </p:sp>
@@ -1161,7 +1172,7 @@
           <a:p>
             <a:fld id="{78C97017-6FC3-485B-9764-EAC9E56C1D49}" type="datetimeFigureOut">
               <a:rPr lang="en-US" smtClean="0"/>
-              <a:t>10/16/2016</a:t>
+              <a:t>10/29/2017</a:t>
             </a:fld>
             <a:endParaRPr lang="en-US"/>
           </a:p>
@@ -1264,10 +1275,9 @@
           </a:lstStyle>
           <a:p>
             <a:r>
-              <a:rPr lang="en-US" smtClean="0"/>
+              <a:rPr lang="en-US"/>
               <a:t>Click to edit Master title style</a:t>
             </a:r>
-            <a:endParaRPr lang="en-US"/>
           </a:p>
         </p:txBody>
       </p:sp>
@@ -1384,7 +1394,7 @@
           <a:p>
             <a:pPr lvl="0"/>
             <a:r>
-              <a:rPr lang="en-US" smtClean="0"/>
+              <a:rPr lang="en-US"/>
               <a:t>Click to edit Master text styles</a:t>
             </a:r>
           </a:p>
@@ -1407,7 +1417,7 @@
           <a:p>
             <a:fld id="{78C97017-6FC3-485B-9764-EAC9E56C1D49}" type="datetimeFigureOut">
               <a:rPr lang="en-US" smtClean="0"/>
-              <a:t>10/16/2016</a:t>
+              <a:t>10/29/2017</a:t>
             </a:fld>
             <a:endParaRPr lang="en-US"/>
           </a:p>
@@ -1501,10 +1511,9 @@
           <a:lstStyle/>
           <a:p>
             <a:r>
-              <a:rPr lang="en-US" smtClean="0"/>
+              <a:rPr lang="en-US"/>
               <a:t>Click to edit Master title style</a:t>
             </a:r>
-            <a:endParaRPr lang="en-US"/>
           </a:p>
         </p:txBody>
       </p:sp>
@@ -1558,38 +1567,37 @@
           <a:p>
             <a:pPr lvl="0"/>
             <a:r>
-              <a:rPr lang="en-US" smtClean="0"/>
+              <a:rPr lang="en-US"/>
               <a:t>Click to edit Master text styles</a:t>
             </a:r>
           </a:p>
           <a:p>
             <a:pPr lvl="1"/>
             <a:r>
-              <a:rPr lang="en-US" smtClean="0"/>
+              <a:rPr lang="en-US"/>
               <a:t>Second level</a:t>
             </a:r>
           </a:p>
           <a:p>
             <a:pPr lvl="2"/>
             <a:r>
-              <a:rPr lang="en-US" smtClean="0"/>
+              <a:rPr lang="en-US"/>
               <a:t>Third level</a:t>
             </a:r>
           </a:p>
           <a:p>
             <a:pPr lvl="3"/>
             <a:r>
-              <a:rPr lang="en-US" smtClean="0"/>
+              <a:rPr lang="en-US"/>
               <a:t>Fourth level</a:t>
             </a:r>
           </a:p>
           <a:p>
             <a:pPr lvl="4"/>
             <a:r>
-              <a:rPr lang="en-US" smtClean="0"/>
+              <a:rPr lang="en-US"/>
               <a:t>Fifth level</a:t>
             </a:r>
-            <a:endParaRPr lang="en-US"/>
           </a:p>
         </p:txBody>
       </p:sp>
@@ -1643,38 +1651,37 @@
           <a:p>
             <a:pPr lvl="0"/>
             <a:r>
-              <a:rPr lang="en-US" smtClean="0"/>
+              <a:rPr lang="en-US"/>
               <a:t>Click to edit Master text styles</a:t>
             </a:r>
           </a:p>
           <a:p>
             <a:pPr lvl="1"/>
             <a:r>
-              <a:rPr lang="en-US" smtClean="0"/>
+              <a:rPr lang="en-US"/>
               <a:t>Second level</a:t>
             </a:r>
           </a:p>
           <a:p>
             <a:pPr lvl="2"/>
             <a:r>
-              <a:rPr lang="en-US" smtClean="0"/>
+              <a:rPr lang="en-US"/>
               <a:t>Third level</a:t>
             </a:r>
           </a:p>
           <a:p>
             <a:pPr lvl="3"/>
             <a:r>
-              <a:rPr lang="en-US" smtClean="0"/>
+              <a:rPr lang="en-US"/>
               <a:t>Fourth level</a:t>
             </a:r>
           </a:p>
           <a:p>
             <a:pPr lvl="4"/>
             <a:r>
-              <a:rPr lang="en-US" smtClean="0"/>
+              <a:rPr lang="en-US"/>
               <a:t>Fifth level</a:t>
             </a:r>
-            <a:endParaRPr lang="en-US"/>
           </a:p>
         </p:txBody>
       </p:sp>
@@ -1695,7 +1702,7 @@
           <a:p>
             <a:fld id="{78C97017-6FC3-485B-9764-EAC9E56C1D49}" type="datetimeFigureOut">
               <a:rPr lang="en-US" smtClean="0"/>
-              <a:t>10/16/2016</a:t>
+              <a:t>10/29/2017</a:t>
             </a:fld>
             <a:endParaRPr lang="en-US"/>
           </a:p>
@@ -1793,10 +1800,9 @@
           </a:lstStyle>
           <a:p>
             <a:r>
-              <a:rPr lang="en-US" smtClean="0"/>
+              <a:rPr lang="en-US"/>
               <a:t>Click to edit Master title style</a:t>
             </a:r>
-            <a:endParaRPr lang="en-US"/>
           </a:p>
         </p:txBody>
       </p:sp>
@@ -1859,7 +1865,7 @@
           <a:p>
             <a:pPr lvl="0"/>
             <a:r>
-              <a:rPr lang="en-US" smtClean="0"/>
+              <a:rPr lang="en-US"/>
               <a:t>Click to edit Master text styles</a:t>
             </a:r>
           </a:p>
@@ -1915,38 +1921,37 @@
           <a:p>
             <a:pPr lvl="0"/>
             <a:r>
-              <a:rPr lang="en-US" smtClean="0"/>
+              <a:rPr lang="en-US"/>
               <a:t>Click to edit Master text styles</a:t>
             </a:r>
           </a:p>
           <a:p>
             <a:pPr lvl="1"/>
             <a:r>
-              <a:rPr lang="en-US" smtClean="0"/>
+              <a:rPr lang="en-US"/>
               <a:t>Second level</a:t>
             </a:r>
           </a:p>
           <a:p>
             <a:pPr lvl="2"/>
             <a:r>
-              <a:rPr lang="en-US" smtClean="0"/>
+              <a:rPr lang="en-US"/>
               <a:t>Third level</a:t>
             </a:r>
           </a:p>
           <a:p>
             <a:pPr lvl="3"/>
             <a:r>
-              <a:rPr lang="en-US" smtClean="0"/>
+              <a:rPr lang="en-US"/>
               <a:t>Fourth level</a:t>
             </a:r>
           </a:p>
           <a:p>
             <a:pPr lvl="4"/>
             <a:r>
-              <a:rPr lang="en-US" smtClean="0"/>
+              <a:rPr lang="en-US"/>
               <a:t>Fifth level</a:t>
             </a:r>
-            <a:endParaRPr lang="en-US"/>
           </a:p>
         </p:txBody>
       </p:sp>
@@ -2009,7 +2014,7 @@
           <a:p>
             <a:pPr lvl="0"/>
             <a:r>
-              <a:rPr lang="en-US" smtClean="0"/>
+              <a:rPr lang="en-US"/>
               <a:t>Click to edit Master text styles</a:t>
             </a:r>
           </a:p>
@@ -2065,38 +2070,37 @@
           <a:p>
             <a:pPr lvl="0"/>
             <a:r>
-              <a:rPr lang="en-US" smtClean="0"/>
+              <a:rPr lang="en-US"/>
               <a:t>Click to edit Master text styles</a:t>
             </a:r>
           </a:p>
           <a:p>
             <a:pPr lvl="1"/>
             <a:r>
-              <a:rPr lang="en-US" smtClean="0"/>
+              <a:rPr lang="en-US"/>
               <a:t>Second level</a:t>
             </a:r>
           </a:p>
           <a:p>
             <a:pPr lvl="2"/>
             <a:r>
-              <a:rPr lang="en-US" smtClean="0"/>
+              <a:rPr lang="en-US"/>
               <a:t>Third level</a:t>
             </a:r>
           </a:p>
           <a:p>
             <a:pPr lvl="3"/>
             <a:r>
-              <a:rPr lang="en-US" smtClean="0"/>
+              <a:rPr lang="en-US"/>
               <a:t>Fourth level</a:t>
             </a:r>
           </a:p>
           <a:p>
             <a:pPr lvl="4"/>
             <a:r>
-              <a:rPr lang="en-US" smtClean="0"/>
+              <a:rPr lang="en-US"/>
               <a:t>Fifth level</a:t>
             </a:r>
-            <a:endParaRPr lang="en-US"/>
           </a:p>
         </p:txBody>
       </p:sp>
@@ -2117,7 +2121,7 @@
           <a:p>
             <a:fld id="{78C97017-6FC3-485B-9764-EAC9E56C1D49}" type="datetimeFigureOut">
               <a:rPr lang="en-US" smtClean="0"/>
-              <a:t>10/16/2016</a:t>
+              <a:t>10/29/2017</a:t>
             </a:fld>
             <a:endParaRPr lang="en-US"/>
           </a:p>
@@ -2211,10 +2215,9 @@
           <a:lstStyle/>
           <a:p>
             <a:r>
-              <a:rPr lang="en-US" smtClean="0"/>
+              <a:rPr lang="en-US"/>
               <a:t>Click to edit Master title style</a:t>
             </a:r>
-            <a:endParaRPr lang="en-US"/>
           </a:p>
         </p:txBody>
       </p:sp>
@@ -2235,7 +2238,7 @@
           <a:p>
             <a:fld id="{78C97017-6FC3-485B-9764-EAC9E56C1D49}" type="datetimeFigureOut">
               <a:rPr lang="en-US" smtClean="0"/>
-              <a:t>10/16/2016</a:t>
+              <a:t>10/29/2017</a:t>
             </a:fld>
             <a:endParaRPr lang="en-US"/>
           </a:p>
@@ -2330,7 +2333,7 @@
           <a:p>
             <a:fld id="{78C97017-6FC3-485B-9764-EAC9E56C1D49}" type="datetimeFigureOut">
               <a:rPr lang="en-US" smtClean="0"/>
-              <a:t>10/16/2016</a:t>
+              <a:t>10/29/2017</a:t>
             </a:fld>
             <a:endParaRPr lang="en-US"/>
           </a:p>
@@ -2433,10 +2436,9 @@
           </a:lstStyle>
           <a:p>
             <a:r>
-              <a:rPr lang="en-US" smtClean="0"/>
+              <a:rPr lang="en-US"/>
               <a:t>Click to edit Master title style</a:t>
             </a:r>
-            <a:endParaRPr lang="en-US"/>
           </a:p>
         </p:txBody>
       </p:sp>
@@ -2490,38 +2492,37 @@
           <a:p>
             <a:pPr lvl="0"/>
             <a:r>
-              <a:rPr lang="en-US" smtClean="0"/>
+              <a:rPr lang="en-US"/>
               <a:t>Click to edit Master text styles</a:t>
             </a:r>
           </a:p>
           <a:p>
             <a:pPr lvl="1"/>
             <a:r>
-              <a:rPr lang="en-US" smtClean="0"/>
+              <a:rPr lang="en-US"/>
               <a:t>Second level</a:t>
             </a:r>
           </a:p>
           <a:p>
             <a:pPr lvl="2"/>
             <a:r>
-              <a:rPr lang="en-US" smtClean="0"/>
+              <a:rPr lang="en-US"/>
               <a:t>Third level</a:t>
             </a:r>
           </a:p>
           <a:p>
             <a:pPr lvl="3"/>
             <a:r>
-              <a:rPr lang="en-US" smtClean="0"/>
+              <a:rPr lang="en-US"/>
               <a:t>Fourth level</a:t>
             </a:r>
           </a:p>
           <a:p>
             <a:pPr lvl="4"/>
             <a:r>
-              <a:rPr lang="en-US" smtClean="0"/>
+              <a:rPr lang="en-US"/>
               <a:t>Fifth level</a:t>
             </a:r>
-            <a:endParaRPr lang="en-US"/>
           </a:p>
         </p:txBody>
       </p:sp>
@@ -2584,7 +2585,7 @@
           <a:p>
             <a:pPr lvl="0"/>
             <a:r>
-              <a:rPr lang="en-US" smtClean="0"/>
+              <a:rPr lang="en-US"/>
               <a:t>Click to edit Master text styles</a:t>
             </a:r>
           </a:p>
@@ -2607,7 +2608,7 @@
           <a:p>
             <a:fld id="{78C97017-6FC3-485B-9764-EAC9E56C1D49}" type="datetimeFigureOut">
               <a:rPr lang="en-US" smtClean="0"/>
-              <a:t>10/16/2016</a:t>
+              <a:t>10/29/2017</a:t>
             </a:fld>
             <a:endParaRPr lang="en-US"/>
           </a:p>
@@ -2710,10 +2711,9 @@
           </a:lstStyle>
           <a:p>
             <a:r>
-              <a:rPr lang="en-US" smtClean="0"/>
+              <a:rPr lang="en-US"/>
               <a:t>Click to edit Master title style</a:t>
             </a:r>
-            <a:endParaRPr lang="en-US"/>
           </a:p>
         </p:txBody>
       </p:sp>
@@ -2837,7 +2837,7 @@
           <a:p>
             <a:pPr lvl="0"/>
             <a:r>
-              <a:rPr lang="en-US" smtClean="0"/>
+              <a:rPr lang="en-US"/>
               <a:t>Click to edit Master text styles</a:t>
             </a:r>
           </a:p>
@@ -2860,7 +2860,7 @@
           <a:p>
             <a:fld id="{78C97017-6FC3-485B-9764-EAC9E56C1D49}" type="datetimeFigureOut">
               <a:rPr lang="en-US" smtClean="0"/>
-              <a:t>10/16/2016</a:t>
+              <a:t>10/29/2017</a:t>
             </a:fld>
             <a:endParaRPr lang="en-US"/>
           </a:p>
@@ -2969,10 +2969,9 @@
           <a:lstStyle/>
           <a:p>
             <a:r>
-              <a:rPr lang="en-US" smtClean="0"/>
+              <a:rPr lang="en-US"/>
               <a:t>Click to edit Master title style</a:t>
             </a:r>
-            <a:endParaRPr lang="en-US"/>
           </a:p>
         </p:txBody>
       </p:sp>
@@ -3003,38 +3002,37 @@
           <a:p>
             <a:pPr lvl="0"/>
             <a:r>
-              <a:rPr lang="en-US" smtClean="0"/>
+              <a:rPr lang="en-US"/>
               <a:t>Click to edit Master text styles</a:t>
             </a:r>
           </a:p>
           <a:p>
             <a:pPr lvl="1"/>
             <a:r>
-              <a:rPr lang="en-US" smtClean="0"/>
+              <a:rPr lang="en-US"/>
               <a:t>Second level</a:t>
             </a:r>
           </a:p>
           <a:p>
             <a:pPr lvl="2"/>
             <a:r>
-              <a:rPr lang="en-US" smtClean="0"/>
+              <a:rPr lang="en-US"/>
               <a:t>Third level</a:t>
             </a:r>
           </a:p>
           <a:p>
             <a:pPr lvl="3"/>
             <a:r>
-              <a:rPr lang="en-US" smtClean="0"/>
+              <a:rPr lang="en-US"/>
               <a:t>Fourth level</a:t>
             </a:r>
           </a:p>
           <a:p>
             <a:pPr lvl="4"/>
             <a:r>
-              <a:rPr lang="en-US" smtClean="0"/>
+              <a:rPr lang="en-US"/>
               <a:t>Fifth level</a:t>
             </a:r>
-            <a:endParaRPr lang="en-US"/>
           </a:p>
         </p:txBody>
       </p:sp>
@@ -3073,7 +3071,7 @@
           <a:p>
             <a:fld id="{78C97017-6FC3-485B-9764-EAC9E56C1D49}" type="datetimeFigureOut">
               <a:rPr lang="en-US" smtClean="0"/>
-              <a:t>10/16/2016</a:t>
+              <a:t>10/29/2017</a:t>
             </a:fld>
             <a:endParaRPr lang="en-US"/>
           </a:p>
@@ -3546,7 +3544,7 @@
           <a:p>
             <a:pPr algn="ctr"/>
             <a:r>
-              <a:rPr lang="en-US" sz="1600" dirty="0" smtClean="0">
+              <a:rPr lang="en-US" sz="1600" dirty="0">
                 <a:solidFill>
                   <a:schemeClr val="bg1"/>
                 </a:solidFill>
@@ -3605,7 +3603,7 @@
           <a:p>
             <a:pPr algn="ctr"/>
             <a:r>
-              <a:rPr lang="en-US" sz="1600" dirty="0" smtClean="0">
+              <a:rPr lang="en-US" sz="1600" dirty="0">
                 <a:solidFill>
                   <a:schemeClr val="bg1"/>
                 </a:solidFill>
@@ -3668,7 +3666,7 @@
           <a:p>
             <a:pPr algn="ctr"/>
             <a:r>
-              <a:rPr lang="en-US" sz="1600" dirty="0" smtClean="0">
+              <a:rPr lang="en-US" sz="1600" dirty="0">
                 <a:solidFill>
                   <a:schemeClr val="bg1"/>
                 </a:solidFill>
@@ -3727,7 +3725,7 @@
           <a:p>
             <a:pPr algn="ctr"/>
             <a:r>
-              <a:rPr lang="en-US" sz="1600" dirty="0" smtClean="0">
+              <a:rPr lang="en-US" sz="1600" dirty="0">
                 <a:solidFill>
                   <a:schemeClr val="bg1"/>
                 </a:solidFill>
@@ -4176,101 +4174,6 @@
       </p:sp>
       <p:sp>
         <p:nvSpPr>
-          <p:cNvPr id="51" name="Cloud 50"/>
-          <p:cNvSpPr/>
-          <p:nvPr/>
-        </p:nvSpPr>
-        <p:spPr>
-          <a:xfrm>
-            <a:off x="2650069" y="1447800"/>
-            <a:ext cx="914400" cy="533400"/>
-          </a:xfrm>
-          <a:prstGeom prst="cloud">
-            <a:avLst/>
-          </a:prstGeom>
-          <a:solidFill>
-            <a:schemeClr val="bg1"/>
-          </a:solidFill>
-          <a:ln>
-            <a:solidFill>
-              <a:schemeClr val="tx1"/>
-            </a:solidFill>
-          </a:ln>
-        </p:spPr>
-        <p:style>
-          <a:lnRef idx="2">
-            <a:schemeClr val="accent1">
-              <a:shade val="50000"/>
-            </a:schemeClr>
-          </a:lnRef>
-          <a:fillRef idx="1">
-            <a:schemeClr val="accent1"/>
-          </a:fillRef>
-          <a:effectRef idx="0">
-            <a:schemeClr val="accent1"/>
-          </a:effectRef>
-          <a:fontRef idx="minor">
-            <a:schemeClr val="lt1"/>
-          </a:fontRef>
-        </p:style>
-        <p:txBody>
-          <a:bodyPr rtlCol="0" anchor="ctr"/>
-          <a:lstStyle/>
-          <a:p>
-            <a:pPr algn="ctr"/>
-            <a:r>
-              <a:rPr lang="en-US" sz="1400" dirty="0">
-                <a:solidFill>
-                  <a:schemeClr val="tx1"/>
-                </a:solidFill>
-              </a:rPr>
-              <a:t>Web</a:t>
-            </a:r>
-          </a:p>
-        </p:txBody>
-      </p:sp>
-      <p:cxnSp>
-        <p:nvCxnSpPr>
-          <p:cNvPr id="52" name="Elbow Connector 51"/>
-          <p:cNvCxnSpPr>
-            <a:stCxn id="2" idx="0"/>
-            <a:endCxn id="51" idx="2"/>
-          </p:cNvCxnSpPr>
-          <p:nvPr/>
-        </p:nvCxnSpPr>
-        <p:spPr>
-          <a:xfrm rot="5400000" flipH="1" flipV="1">
-            <a:off x="2222648" y="1760922"/>
-            <a:ext cx="476678" cy="383835"/>
-          </a:xfrm>
-          <a:prstGeom prst="bentConnector2">
-            <a:avLst/>
-          </a:prstGeom>
-          <a:ln w="28575">
-            <a:solidFill>
-              <a:srgbClr val="00B050"/>
-            </a:solidFill>
-            <a:prstDash val="sysDot"/>
-            <a:tailEnd type="arrow"/>
-          </a:ln>
-        </p:spPr>
-        <p:style>
-          <a:lnRef idx="1">
-            <a:schemeClr val="accent1"/>
-          </a:lnRef>
-          <a:fillRef idx="0">
-            <a:schemeClr val="accent1"/>
-          </a:fillRef>
-          <a:effectRef idx="0">
-            <a:schemeClr val="accent1"/>
-          </a:effectRef>
-          <a:fontRef idx="minor">
-            <a:schemeClr val="tx1"/>
-          </a:fontRef>
-        </p:style>
-      </p:cxnSp>
-      <p:sp>
-        <p:nvSpPr>
           <p:cNvPr id="23" name="Rectangle 62"/>
           <p:cNvSpPr/>
           <p:nvPr/>
@@ -4313,7 +4216,7 @@
           <a:p>
             <a:pPr algn="ctr"/>
             <a:r>
-              <a:rPr lang="en-US" sz="1600" dirty="0" smtClean="0">
+              <a:rPr lang="en-US" sz="1600" dirty="0">
                 <a:solidFill>
                   <a:schemeClr val="bg1"/>
                 </a:solidFill>
@@ -4664,7 +4567,7 @@
           <a:p>
             <a:pPr algn="ctr"/>
             <a:r>
-              <a:rPr lang="en-US" sz="1600" dirty="0" smtClean="0">
+              <a:rPr lang="en-US" sz="1600" dirty="0">
                 <a:solidFill>
                   <a:schemeClr val="bg1"/>
                 </a:solidFill>
@@ -4672,25 +4575,20 @@
               <a:t>Logs</a:t>
             </a:r>
             <a:br>
-              <a:rPr lang="en-US" sz="1600" dirty="0" smtClean="0">
+              <a:rPr lang="en-US" sz="1600" dirty="0">
                 <a:solidFill>
                   <a:schemeClr val="bg1"/>
                 </a:solidFill>
               </a:rPr>
             </a:br>
             <a:r>
-              <a:rPr lang="en-US" sz="1600" dirty="0" smtClean="0">
+              <a:rPr lang="en-US" sz="1600" dirty="0">
                 <a:solidFill>
                   <a:schemeClr val="bg1"/>
                 </a:solidFill>
               </a:rPr>
               <a:t>Center</a:t>
             </a:r>
-            <a:endParaRPr lang="en-US" sz="1600" dirty="0">
-              <a:solidFill>
-                <a:schemeClr val="bg1"/>
-              </a:solidFill>
-            </a:endParaRPr>
           </a:p>
         </p:txBody>
       </p:sp>

</xml_diff>

<commit_message>
Normalize all the line endings
</commit_message>
<xml_diff>
--- a/docs/diagrams/ArchitectureDiagram.pptx
+++ b/docs/diagrams/ArchitectureDiagram.pptx
@@ -1,114 +1,3 @@
-
-<file path=ppt/presentation.xml><?xml version="1.0" encoding="utf-8"?>
-<p:presentation xmlns:a="http://schemas.openxmlformats.org/drawingml/2006/main" xmlns:r="http://schemas.openxmlformats.org/officeDocument/2006/relationships" xmlns:p="http://schemas.openxmlformats.org/presentationml/2006/main" saveSubsetFonts="1">
-  <p:sldMasterIdLst>
-    <p:sldMasterId id="2147483648" r:id="rId1"/>
-  </p:sldMasterIdLst>
-  <p:notesMasterIdLst>
-    <p:notesMasterId r:id="rId3"/>
-  </p:notesMasterIdLst>
-  <p:sldIdLst>
-    <p:sldId id="259" r:id="rId2"/>
-  </p:sldIdLst>
-  <p:sldSz cx="9144000" cy="6858000" type="screen4x3"/>
-  <p:notesSz cx="6858000" cy="9144000"/>
-  <p:defaultTextStyle>
-    <a:defPPr>
-      <a:defRPr lang="en-US"/>
-    </a:defPPr>
-    <a:lvl1pPr marL="0" algn="l" defTabSz="914400" rtl="0" eaLnBrk="1" latinLnBrk="0" hangingPunct="1">
-      <a:defRPr sz="1800" kern="1200">
-        <a:solidFill>
-          <a:schemeClr val="tx1"/>
-        </a:solidFill>
-        <a:latin typeface="+mn-lt"/>
-        <a:ea typeface="+mn-ea"/>
-        <a:cs typeface="+mn-cs"/>
-      </a:defRPr>
-    </a:lvl1pPr>
-    <a:lvl2pPr marL="457200" algn="l" defTabSz="914400" rtl="0" eaLnBrk="1" latinLnBrk="0" hangingPunct="1">
-      <a:defRPr sz="1800" kern="1200">
-        <a:solidFill>
-          <a:schemeClr val="tx1"/>
-        </a:solidFill>
-        <a:latin typeface="+mn-lt"/>
-        <a:ea typeface="+mn-ea"/>
-        <a:cs typeface="+mn-cs"/>
-      </a:defRPr>
-    </a:lvl2pPr>
-    <a:lvl3pPr marL="914400" algn="l" defTabSz="914400" rtl="0" eaLnBrk="1" latinLnBrk="0" hangingPunct="1">
-      <a:defRPr sz="1800" kern="1200">
-        <a:solidFill>
-          <a:schemeClr val="tx1"/>
-        </a:solidFill>
-        <a:latin typeface="+mn-lt"/>
-        <a:ea typeface="+mn-ea"/>
-        <a:cs typeface="+mn-cs"/>
-      </a:defRPr>
-    </a:lvl3pPr>
-    <a:lvl4pPr marL="1371600" algn="l" defTabSz="914400" rtl="0" eaLnBrk="1" latinLnBrk="0" hangingPunct="1">
-      <a:defRPr sz="1800" kern="1200">
-        <a:solidFill>
-          <a:schemeClr val="tx1"/>
-        </a:solidFill>
-        <a:latin typeface="+mn-lt"/>
-        <a:ea typeface="+mn-ea"/>
-        <a:cs typeface="+mn-cs"/>
-      </a:defRPr>
-    </a:lvl4pPr>
-    <a:lvl5pPr marL="1828800" algn="l" defTabSz="914400" rtl="0" eaLnBrk="1" latinLnBrk="0" hangingPunct="1">
-      <a:defRPr sz="1800" kern="1200">
-        <a:solidFill>
-          <a:schemeClr val="tx1"/>
-        </a:solidFill>
-        <a:latin typeface="+mn-lt"/>
-        <a:ea typeface="+mn-ea"/>
-        <a:cs typeface="+mn-cs"/>
-      </a:defRPr>
-    </a:lvl5pPr>
-    <a:lvl6pPr marL="2286000" algn="l" defTabSz="914400" rtl="0" eaLnBrk="1" latinLnBrk="0" hangingPunct="1">
-      <a:defRPr sz="1800" kern="1200">
-        <a:solidFill>
-          <a:schemeClr val="tx1"/>
-        </a:solidFill>
-        <a:latin typeface="+mn-lt"/>
-        <a:ea typeface="+mn-ea"/>
-        <a:cs typeface="+mn-cs"/>
-      </a:defRPr>
-    </a:lvl6pPr>
-    <a:lvl7pPr marL="2743200" algn="l" defTabSz="914400" rtl="0" eaLnBrk="1" latinLnBrk="0" hangingPunct="1">
-      <a:defRPr sz="1800" kern="1200">
-        <a:solidFill>
-          <a:schemeClr val="tx1"/>
-        </a:solidFill>
-        <a:latin typeface="+mn-lt"/>
-        <a:ea typeface="+mn-ea"/>
-        <a:cs typeface="+mn-cs"/>
-      </a:defRPr>
-    </a:lvl7pPr>
-    <a:lvl8pPr marL="3200400" algn="l" defTabSz="914400" rtl="0" eaLnBrk="1" latinLnBrk="0" hangingPunct="1">
-      <a:defRPr sz="1800" kern="1200">
-        <a:solidFill>
-          <a:schemeClr val="tx1"/>
-        </a:solidFill>
-        <a:latin typeface="+mn-lt"/>
-        <a:ea typeface="+mn-ea"/>
-        <a:cs typeface="+mn-cs"/>
-      </a:defRPr>
-    </a:lvl8pPr>
-    <a:lvl9pPr marL="3657600" algn="l" defTabSz="914400" rtl="0" eaLnBrk="1" latinLnBrk="0" hangingPunct="1">
-      <a:defRPr sz="1800" kern="1200">
-        <a:solidFill>
-          <a:schemeClr val="tx1"/>
-        </a:solidFill>
-        <a:latin typeface="+mn-lt"/>
-        <a:ea typeface="+mn-ea"/>
-        <a:cs typeface="+mn-cs"/>
-      </a:defRPr>
-    </a:lvl9pPr>
-  </p:defaultTextStyle>
-</p:presentation>
-</file>
 
 <file path=ppt/notesMasters/notesMaster1.xml><?xml version="1.0" encoding="utf-8"?>
 <p:notesMaster xmlns:a="http://schemas.openxmlformats.org/drawingml/2006/main" xmlns:r="http://schemas.openxmlformats.org/officeDocument/2006/relationships" xmlns:p="http://schemas.openxmlformats.org/presentationml/2006/main">
@@ -3429,1361 +3318,6 @@
     </p:otherStyle>
   </p:txStyles>
 </p:sldMaster>
-</file>
-
-<file path=ppt/slides/slide1.xml><?xml version="1.0" encoding="utf-8"?>
-<p:sld xmlns:a="http://schemas.openxmlformats.org/drawingml/2006/main" xmlns:r="http://schemas.openxmlformats.org/officeDocument/2006/relationships" xmlns:p="http://schemas.openxmlformats.org/presentationml/2006/main">
-  <p:cSld>
-    <p:spTree>
-      <p:nvGrpSpPr>
-        <p:cNvPr id="1" name=""/>
-        <p:cNvGrpSpPr/>
-        <p:nvPr/>
-      </p:nvGrpSpPr>
-      <p:grpSpPr>
-        <a:xfrm>
-          <a:off x="0" y="0"/>
-          <a:ext cx="0" cy="0"/>
-          <a:chOff x="0" y="0"/>
-          <a:chExt cx="0" cy="0"/>
-        </a:xfrm>
-      </p:grpSpPr>
-      <p:sp>
-        <p:nvSpPr>
-          <p:cNvPr id="15" name="Rounded Rectangle 14"/>
-          <p:cNvSpPr/>
-          <p:nvPr/>
-        </p:nvSpPr>
-        <p:spPr>
-          <a:xfrm>
-            <a:off x="1636188" y="2057400"/>
-            <a:ext cx="5700181" cy="2667000"/>
-          </a:xfrm>
-          <a:prstGeom prst="roundRect">
-            <a:avLst>
-              <a:gd name="adj" fmla="val 5768"/>
-            </a:avLst>
-          </a:prstGeom>
-          <a:solidFill>
-            <a:schemeClr val="bg1">
-              <a:lumMod val="95000"/>
-            </a:schemeClr>
-          </a:solidFill>
-          <a:ln>
-            <a:solidFill>
-              <a:schemeClr val="bg1">
-                <a:lumMod val="85000"/>
-              </a:schemeClr>
-            </a:solidFill>
-          </a:ln>
-        </p:spPr>
-        <p:style>
-          <a:lnRef idx="2">
-            <a:schemeClr val="accent1">
-              <a:shade val="50000"/>
-            </a:schemeClr>
-          </a:lnRef>
-          <a:fillRef idx="1">
-            <a:schemeClr val="accent1"/>
-          </a:fillRef>
-          <a:effectRef idx="0">
-            <a:schemeClr val="accent1"/>
-          </a:effectRef>
-          <a:fontRef idx="minor">
-            <a:schemeClr val="lt1"/>
-          </a:fontRef>
-        </p:style>
-        <p:txBody>
-          <a:bodyPr rtlCol="0" anchor="ctr"/>
-          <a:lstStyle/>
-          <a:p>
-            <a:pPr algn="ctr"/>
-            <a:endParaRPr lang="en-US"/>
-          </a:p>
-        </p:txBody>
-      </p:sp>
-      <p:sp>
-        <p:nvSpPr>
-          <p:cNvPr id="2" name="Rectangle 62"/>
-          <p:cNvSpPr/>
-          <p:nvPr/>
-        </p:nvSpPr>
-        <p:spPr>
-          <a:xfrm flipH="1">
-            <a:off x="1964269" y="2191178"/>
-            <a:ext cx="609602" cy="1294917"/>
-          </a:xfrm>
-          <a:prstGeom prst="roundRect">
-            <a:avLst/>
-          </a:prstGeom>
-          <a:solidFill>
-            <a:srgbClr val="00B050"/>
-          </a:solidFill>
-          <a:ln w="19050">
-            <a:solidFill>
-              <a:srgbClr val="00B050"/>
-            </a:solidFill>
-          </a:ln>
-          <a:effectLst/>
-        </p:spPr>
-        <p:style>
-          <a:lnRef idx="1">
-            <a:schemeClr val="accent2"/>
-          </a:lnRef>
-          <a:fillRef idx="2">
-            <a:schemeClr val="accent2"/>
-          </a:fillRef>
-          <a:effectRef idx="1">
-            <a:schemeClr val="accent2"/>
-          </a:effectRef>
-          <a:fontRef idx="minor">
-            <a:schemeClr val="dk1"/>
-          </a:fontRef>
-        </p:style>
-        <p:txBody>
-          <a:bodyPr rtlCol="0" anchor="ctr"/>
-          <a:lstStyle/>
-          <a:p>
-            <a:pPr algn="ctr"/>
-            <a:r>
-              <a:rPr lang="en-US" sz="1600" dirty="0" smtClean="0">
-                <a:solidFill>
-                  <a:schemeClr val="bg1"/>
-                </a:solidFill>
-              </a:rPr>
-              <a:t>UI</a:t>
-            </a:r>
-            <a:endParaRPr lang="en-SG" sz="1600" dirty="0">
-              <a:solidFill>
-                <a:schemeClr val="bg1"/>
-              </a:solidFill>
-            </a:endParaRPr>
-          </a:p>
-        </p:txBody>
-      </p:sp>
-      <p:sp>
-        <p:nvSpPr>
-          <p:cNvPr id="3" name="Rectangle 45"/>
-          <p:cNvSpPr/>
-          <p:nvPr/>
-        </p:nvSpPr>
-        <p:spPr>
-          <a:xfrm>
-            <a:off x="3412069" y="2191178"/>
-            <a:ext cx="1295400" cy="552022"/>
-          </a:xfrm>
-          <a:prstGeom prst="roundRect">
-            <a:avLst/>
-          </a:prstGeom>
-          <a:solidFill>
-            <a:srgbClr val="0070C0"/>
-          </a:solidFill>
-          <a:ln w="19050">
-            <a:solidFill>
-              <a:srgbClr val="0070C0"/>
-            </a:solidFill>
-          </a:ln>
-          <a:effectLst/>
-        </p:spPr>
-        <p:style>
-          <a:lnRef idx="1">
-            <a:schemeClr val="accent5"/>
-          </a:lnRef>
-          <a:fillRef idx="2">
-            <a:schemeClr val="accent5"/>
-          </a:fillRef>
-          <a:effectRef idx="1">
-            <a:schemeClr val="accent5"/>
-          </a:effectRef>
-          <a:fontRef idx="minor">
-            <a:schemeClr val="dk1"/>
-          </a:fontRef>
-        </p:style>
-        <p:txBody>
-          <a:bodyPr rtlCol="0" anchor="ctr"/>
-          <a:lstStyle/>
-          <a:p>
-            <a:pPr algn="ctr"/>
-            <a:r>
-              <a:rPr lang="en-US" sz="1600" dirty="0" smtClean="0">
-                <a:solidFill>
-                  <a:schemeClr val="bg1"/>
-                </a:solidFill>
-              </a:rPr>
-              <a:t>Logic</a:t>
-            </a:r>
-            <a:endParaRPr lang="en-SG" sz="1600" dirty="0">
-              <a:solidFill>
-                <a:schemeClr val="bg1"/>
-              </a:solidFill>
-            </a:endParaRPr>
-          </a:p>
-        </p:txBody>
-      </p:sp>
-      <p:sp>
-        <p:nvSpPr>
-          <p:cNvPr id="4" name="Rectangle 45"/>
-          <p:cNvSpPr/>
-          <p:nvPr/>
-        </p:nvSpPr>
-        <p:spPr>
-          <a:xfrm>
-            <a:off x="5164669" y="2191179"/>
-            <a:ext cx="1447800" cy="552022"/>
-          </a:xfrm>
-          <a:prstGeom prst="roundRect">
-            <a:avLst/>
-          </a:prstGeom>
-          <a:solidFill>
-            <a:schemeClr val="accent6">
-              <a:lumMod val="75000"/>
-            </a:schemeClr>
-          </a:solidFill>
-          <a:ln w="19050">
-            <a:solidFill>
-              <a:schemeClr val="accent6">
-                <a:lumMod val="75000"/>
-              </a:schemeClr>
-            </a:solidFill>
-          </a:ln>
-          <a:effectLst/>
-        </p:spPr>
-        <p:style>
-          <a:lnRef idx="1">
-            <a:schemeClr val="accent5"/>
-          </a:lnRef>
-          <a:fillRef idx="2">
-            <a:schemeClr val="accent5"/>
-          </a:fillRef>
-          <a:effectRef idx="1">
-            <a:schemeClr val="accent5"/>
-          </a:effectRef>
-          <a:fontRef idx="minor">
-            <a:schemeClr val="dk1"/>
-          </a:fontRef>
-        </p:style>
-        <p:txBody>
-          <a:bodyPr rtlCol="0" anchor="ctr"/>
-          <a:lstStyle/>
-          <a:p>
-            <a:pPr algn="ctr"/>
-            <a:r>
-              <a:rPr lang="en-US" sz="1600" dirty="0" smtClean="0">
-                <a:solidFill>
-                  <a:schemeClr val="bg1"/>
-                </a:solidFill>
-              </a:rPr>
-              <a:t>Storage</a:t>
-            </a:r>
-            <a:endParaRPr lang="en-SG" sz="1600" dirty="0">
-              <a:solidFill>
-                <a:schemeClr val="bg1"/>
-              </a:solidFill>
-            </a:endParaRPr>
-          </a:p>
-        </p:txBody>
-      </p:sp>
-      <p:sp>
-        <p:nvSpPr>
-          <p:cNvPr id="5" name="Rectangle 45"/>
-          <p:cNvSpPr/>
-          <p:nvPr/>
-        </p:nvSpPr>
-        <p:spPr>
-          <a:xfrm>
-            <a:off x="3412069" y="3124200"/>
-            <a:ext cx="1295400" cy="723791"/>
-          </a:xfrm>
-          <a:prstGeom prst="roundRect">
-            <a:avLst/>
-          </a:prstGeom>
-          <a:solidFill>
-            <a:srgbClr val="7030A0"/>
-          </a:solidFill>
-          <a:ln w="19050">
-            <a:solidFill>
-              <a:srgbClr val="7030A0"/>
-            </a:solidFill>
-          </a:ln>
-          <a:effectLst/>
-        </p:spPr>
-        <p:style>
-          <a:lnRef idx="1">
-            <a:schemeClr val="accent5"/>
-          </a:lnRef>
-          <a:fillRef idx="2">
-            <a:schemeClr val="accent5"/>
-          </a:fillRef>
-          <a:effectRef idx="1">
-            <a:schemeClr val="accent5"/>
-          </a:effectRef>
-          <a:fontRef idx="minor">
-            <a:schemeClr val="dk1"/>
-          </a:fontRef>
-        </p:style>
-        <p:txBody>
-          <a:bodyPr rtlCol="0" anchor="ctr"/>
-          <a:lstStyle/>
-          <a:p>
-            <a:pPr algn="ctr"/>
-            <a:r>
-              <a:rPr lang="en-US" sz="1600" dirty="0" smtClean="0">
-                <a:solidFill>
-                  <a:schemeClr val="bg1"/>
-                </a:solidFill>
-              </a:rPr>
-              <a:t>Model</a:t>
-            </a:r>
-            <a:endParaRPr lang="en-SG" sz="1600" dirty="0">
-              <a:solidFill>
-                <a:schemeClr val="bg1"/>
-              </a:solidFill>
-            </a:endParaRPr>
-          </a:p>
-        </p:txBody>
-      </p:sp>
-      <p:sp>
-        <p:nvSpPr>
-          <p:cNvPr id="8" name="Rectangle 45"/>
-          <p:cNvSpPr/>
-          <p:nvPr/>
-        </p:nvSpPr>
-        <p:spPr>
-          <a:xfrm>
-            <a:off x="3217846" y="4131994"/>
-            <a:ext cx="2658531" cy="444640"/>
-          </a:xfrm>
-          <a:prstGeom prst="roundRect">
-            <a:avLst/>
-          </a:prstGeom>
-          <a:solidFill>
-            <a:schemeClr val="accent5">
-              <a:lumMod val="75000"/>
-            </a:schemeClr>
-          </a:solidFill>
-          <a:ln w="19050">
-            <a:solidFill>
-              <a:schemeClr val="accent5">
-                <a:lumMod val="75000"/>
-              </a:schemeClr>
-            </a:solidFill>
-          </a:ln>
-          <a:effectLst/>
-        </p:spPr>
-        <p:style>
-          <a:lnRef idx="1">
-            <a:schemeClr val="accent5"/>
-          </a:lnRef>
-          <a:fillRef idx="2">
-            <a:schemeClr val="accent5"/>
-          </a:fillRef>
-          <a:effectRef idx="1">
-            <a:schemeClr val="accent5"/>
-          </a:effectRef>
-          <a:fontRef idx="minor">
-            <a:schemeClr val="dk1"/>
-          </a:fontRef>
-        </p:style>
-        <p:txBody>
-          <a:bodyPr rtlCol="0" anchor="ctr"/>
-          <a:lstStyle/>
-          <a:p>
-            <a:pPr algn="ctr"/>
-            <a:r>
-              <a:rPr lang="en-US" sz="1400" dirty="0">
-                <a:solidFill>
-                  <a:schemeClr val="bg1"/>
-                </a:solidFill>
-              </a:rPr>
-              <a:t>Commons</a:t>
-            </a:r>
-            <a:endParaRPr lang="en-SG" sz="1400" dirty="0">
-              <a:solidFill>
-                <a:schemeClr val="bg1"/>
-              </a:solidFill>
-            </a:endParaRPr>
-          </a:p>
-        </p:txBody>
-      </p:sp>
-      <p:cxnSp>
-        <p:nvCxnSpPr>
-          <p:cNvPr id="10" name="Straight Arrow Connector 9"/>
-          <p:cNvCxnSpPr>
-            <a:endCxn id="3" idx="1"/>
-          </p:cNvCxnSpPr>
-          <p:nvPr/>
-        </p:nvCxnSpPr>
-        <p:spPr>
-          <a:xfrm>
-            <a:off x="2573871" y="2467189"/>
-            <a:ext cx="838198" cy="0"/>
-          </a:xfrm>
-          <a:prstGeom prst="straightConnector1">
-            <a:avLst/>
-          </a:prstGeom>
-          <a:ln w="28575">
-            <a:solidFill>
-              <a:srgbClr val="00B050"/>
-            </a:solidFill>
-            <a:tailEnd type="arrow"/>
-          </a:ln>
-        </p:spPr>
-        <p:style>
-          <a:lnRef idx="1">
-            <a:schemeClr val="accent1"/>
-          </a:lnRef>
-          <a:fillRef idx="0">
-            <a:schemeClr val="accent1"/>
-          </a:fillRef>
-          <a:effectRef idx="0">
-            <a:schemeClr val="accent1"/>
-          </a:effectRef>
-          <a:fontRef idx="minor">
-            <a:schemeClr val="tx1"/>
-          </a:fontRef>
-        </p:style>
-      </p:cxnSp>
-      <p:cxnSp>
-        <p:nvCxnSpPr>
-          <p:cNvPr id="12" name="Straight Arrow Connector 11"/>
-          <p:cNvCxnSpPr/>
-          <p:nvPr/>
-        </p:nvCxnSpPr>
-        <p:spPr>
-          <a:xfrm>
-            <a:off x="2569639" y="3276600"/>
-            <a:ext cx="838198" cy="0"/>
-          </a:xfrm>
-          <a:prstGeom prst="straightConnector1">
-            <a:avLst/>
-          </a:prstGeom>
-          <a:ln w="28575">
-            <a:solidFill>
-              <a:srgbClr val="00B050"/>
-            </a:solidFill>
-            <a:tailEnd type="arrow"/>
-          </a:ln>
-        </p:spPr>
-        <p:style>
-          <a:lnRef idx="1">
-            <a:schemeClr val="accent1"/>
-          </a:lnRef>
-          <a:fillRef idx="0">
-            <a:schemeClr val="accent1"/>
-          </a:fillRef>
-          <a:effectRef idx="0">
-            <a:schemeClr val="accent1"/>
-          </a:effectRef>
-          <a:fontRef idx="minor">
-            <a:schemeClr val="tx1"/>
-          </a:fontRef>
-        </p:style>
-      </p:cxnSp>
-      <p:cxnSp>
-        <p:nvCxnSpPr>
-          <p:cNvPr id="13" name="Straight Arrow Connector 12"/>
-          <p:cNvCxnSpPr>
-            <a:stCxn id="3" idx="2"/>
-            <a:endCxn id="5" idx="0"/>
-          </p:cNvCxnSpPr>
-          <p:nvPr/>
-        </p:nvCxnSpPr>
-        <p:spPr>
-          <a:xfrm>
-            <a:off x="4059769" y="2743200"/>
-            <a:ext cx="0" cy="381000"/>
-          </a:xfrm>
-          <a:prstGeom prst="straightConnector1">
-            <a:avLst/>
-          </a:prstGeom>
-          <a:ln w="28575">
-            <a:solidFill>
-              <a:srgbClr val="0070C0"/>
-            </a:solidFill>
-            <a:tailEnd type="arrow"/>
-          </a:ln>
-        </p:spPr>
-        <p:style>
-          <a:lnRef idx="1">
-            <a:schemeClr val="accent1"/>
-          </a:lnRef>
-          <a:fillRef idx="0">
-            <a:schemeClr val="accent1"/>
-          </a:fillRef>
-          <a:effectRef idx="0">
-            <a:schemeClr val="accent1"/>
-          </a:effectRef>
-          <a:fontRef idx="minor">
-            <a:schemeClr val="tx1"/>
-          </a:fontRef>
-        </p:style>
-      </p:cxnSp>
-      <p:cxnSp>
-        <p:nvCxnSpPr>
-          <p:cNvPr id="16" name="Straight Arrow Connector 15"/>
-          <p:cNvCxnSpPr/>
-          <p:nvPr/>
-        </p:nvCxnSpPr>
-        <p:spPr>
-          <a:xfrm>
-            <a:off x="4707469" y="2467189"/>
-            <a:ext cx="457200" cy="0"/>
-          </a:xfrm>
-          <a:prstGeom prst="straightConnector1">
-            <a:avLst/>
-          </a:prstGeom>
-          <a:ln w="28575">
-            <a:solidFill>
-              <a:srgbClr val="0070C0"/>
-            </a:solidFill>
-            <a:tailEnd type="arrow"/>
-          </a:ln>
-        </p:spPr>
-        <p:style>
-          <a:lnRef idx="1">
-            <a:schemeClr val="accent1"/>
-          </a:lnRef>
-          <a:fillRef idx="0">
-            <a:schemeClr val="accent1"/>
-          </a:fillRef>
-          <a:effectRef idx="0">
-            <a:schemeClr val="accent1"/>
-          </a:effectRef>
-          <a:fontRef idx="minor">
-            <a:schemeClr val="tx1"/>
-          </a:fontRef>
-        </p:style>
-      </p:cxnSp>
-      <p:sp>
-        <p:nvSpPr>
-          <p:cNvPr id="29" name="Smiley Face 28"/>
-          <p:cNvSpPr/>
-          <p:nvPr/>
-        </p:nvSpPr>
-        <p:spPr>
-          <a:xfrm>
-            <a:off x="1202269" y="2743200"/>
-            <a:ext cx="381000" cy="381000"/>
-          </a:xfrm>
-          <a:prstGeom prst="smileyFace">
-            <a:avLst/>
-          </a:prstGeom>
-          <a:solidFill>
-            <a:schemeClr val="bg1"/>
-          </a:solidFill>
-          <a:ln>
-            <a:solidFill>
-              <a:schemeClr val="tx1"/>
-            </a:solidFill>
-          </a:ln>
-        </p:spPr>
-        <p:style>
-          <a:lnRef idx="2">
-            <a:schemeClr val="accent1">
-              <a:shade val="50000"/>
-            </a:schemeClr>
-          </a:lnRef>
-          <a:fillRef idx="1">
-            <a:schemeClr val="accent1"/>
-          </a:fillRef>
-          <a:effectRef idx="0">
-            <a:schemeClr val="accent1"/>
-          </a:effectRef>
-          <a:fontRef idx="minor">
-            <a:schemeClr val="lt1"/>
-          </a:fontRef>
-        </p:style>
-        <p:txBody>
-          <a:bodyPr rtlCol="0" anchor="ctr"/>
-          <a:lstStyle/>
-          <a:p>
-            <a:pPr algn="ctr"/>
-            <a:endParaRPr lang="en-US"/>
-          </a:p>
-        </p:txBody>
-      </p:sp>
-      <p:cxnSp>
-        <p:nvCxnSpPr>
-          <p:cNvPr id="32" name="Straight Arrow Connector 31"/>
-          <p:cNvCxnSpPr/>
-          <p:nvPr/>
-        </p:nvCxnSpPr>
-        <p:spPr>
-          <a:xfrm flipV="1">
-            <a:off x="1636188" y="2939996"/>
-            <a:ext cx="273050" cy="1"/>
-          </a:xfrm>
-          <a:prstGeom prst="straightConnector1">
-            <a:avLst/>
-          </a:prstGeom>
-          <a:ln w="28575">
-            <a:solidFill>
-              <a:schemeClr val="tx1"/>
-            </a:solidFill>
-            <a:prstDash val="sysDot"/>
-            <a:tailEnd type="arrow"/>
-          </a:ln>
-        </p:spPr>
-        <p:style>
-          <a:lnRef idx="1">
-            <a:schemeClr val="accent1"/>
-          </a:lnRef>
-          <a:fillRef idx="0">
-            <a:schemeClr val="accent1"/>
-          </a:fillRef>
-          <a:effectRef idx="0">
-            <a:schemeClr val="accent1"/>
-          </a:effectRef>
-          <a:fontRef idx="minor">
-            <a:schemeClr val="tx1"/>
-          </a:fontRef>
-        </p:style>
-      </p:cxnSp>
-      <p:cxnSp>
-        <p:nvCxnSpPr>
-          <p:cNvPr id="34" name="Straight Arrow Connector 33"/>
-          <p:cNvCxnSpPr/>
-          <p:nvPr/>
-        </p:nvCxnSpPr>
-        <p:spPr>
-          <a:xfrm flipV="1">
-            <a:off x="6680199" y="2467190"/>
-            <a:ext cx="939801" cy="1"/>
-          </a:xfrm>
-          <a:prstGeom prst="straightConnector1">
-            <a:avLst/>
-          </a:prstGeom>
-          <a:ln w="28575">
-            <a:solidFill>
-              <a:schemeClr val="accent6">
-                <a:lumMod val="75000"/>
-              </a:schemeClr>
-            </a:solidFill>
-            <a:prstDash val="sysDot"/>
-            <a:tailEnd type="arrow"/>
-          </a:ln>
-        </p:spPr>
-        <p:style>
-          <a:lnRef idx="1">
-            <a:schemeClr val="accent1"/>
-          </a:lnRef>
-          <a:fillRef idx="0">
-            <a:schemeClr val="accent1"/>
-          </a:fillRef>
-          <a:effectRef idx="0">
-            <a:schemeClr val="accent1"/>
-          </a:effectRef>
-          <a:fontRef idx="minor">
-            <a:schemeClr val="tx1"/>
-          </a:fontRef>
-        </p:style>
-      </p:cxnSp>
-      <p:sp>
-        <p:nvSpPr>
-          <p:cNvPr id="35" name="Folded Corner 34"/>
-          <p:cNvSpPr/>
-          <p:nvPr/>
-        </p:nvSpPr>
-        <p:spPr>
-          <a:xfrm>
-            <a:off x="7679269" y="2286000"/>
-            <a:ext cx="381000" cy="381000"/>
-          </a:xfrm>
-          <a:prstGeom prst="foldedCorner">
-            <a:avLst/>
-          </a:prstGeom>
-          <a:solidFill>
-            <a:schemeClr val="bg1"/>
-          </a:solidFill>
-          <a:ln>
-            <a:solidFill>
-              <a:schemeClr val="tx1"/>
-            </a:solidFill>
-          </a:ln>
-        </p:spPr>
-        <p:style>
-          <a:lnRef idx="2">
-            <a:schemeClr val="accent1">
-              <a:shade val="50000"/>
-            </a:schemeClr>
-          </a:lnRef>
-          <a:fillRef idx="1">
-            <a:schemeClr val="accent1"/>
-          </a:fillRef>
-          <a:effectRef idx="0">
-            <a:schemeClr val="accent1"/>
-          </a:effectRef>
-          <a:fontRef idx="minor">
-            <a:schemeClr val="lt1"/>
-          </a:fontRef>
-        </p:style>
-        <p:txBody>
-          <a:bodyPr rtlCol="0" anchor="ctr"/>
-          <a:lstStyle/>
-          <a:p>
-            <a:pPr algn="ctr"/>
-            <a:endParaRPr lang="en-US"/>
-          </a:p>
-        </p:txBody>
-      </p:sp>
-      <p:sp>
-        <p:nvSpPr>
-          <p:cNvPr id="36" name="Folded Corner 35"/>
-          <p:cNvSpPr/>
-          <p:nvPr/>
-        </p:nvSpPr>
-        <p:spPr>
-          <a:xfrm>
-            <a:off x="7772400" y="2362200"/>
-            <a:ext cx="381000" cy="381000"/>
-          </a:xfrm>
-          <a:prstGeom prst="foldedCorner">
-            <a:avLst/>
-          </a:prstGeom>
-          <a:solidFill>
-            <a:schemeClr val="bg1"/>
-          </a:solidFill>
-          <a:ln>
-            <a:solidFill>
-              <a:schemeClr val="tx1"/>
-            </a:solidFill>
-          </a:ln>
-        </p:spPr>
-        <p:style>
-          <a:lnRef idx="2">
-            <a:schemeClr val="accent1">
-              <a:shade val="50000"/>
-            </a:schemeClr>
-          </a:lnRef>
-          <a:fillRef idx="1">
-            <a:schemeClr val="accent1"/>
-          </a:fillRef>
-          <a:effectRef idx="0">
-            <a:schemeClr val="accent1"/>
-          </a:effectRef>
-          <a:fontRef idx="minor">
-            <a:schemeClr val="lt1"/>
-          </a:fontRef>
-        </p:style>
-        <p:txBody>
-          <a:bodyPr rtlCol="0" anchor="ctr"/>
-          <a:lstStyle/>
-          <a:p>
-            <a:pPr algn="ctr"/>
-            <a:endParaRPr lang="en-US"/>
-          </a:p>
-        </p:txBody>
-      </p:sp>
-      <p:sp>
-        <p:nvSpPr>
-          <p:cNvPr id="51" name="Cloud 50"/>
-          <p:cNvSpPr/>
-          <p:nvPr/>
-        </p:nvSpPr>
-        <p:spPr>
-          <a:xfrm>
-            <a:off x="2650069" y="1447800"/>
-            <a:ext cx="914400" cy="533400"/>
-          </a:xfrm>
-          <a:prstGeom prst="cloud">
-            <a:avLst/>
-          </a:prstGeom>
-          <a:solidFill>
-            <a:schemeClr val="bg1"/>
-          </a:solidFill>
-          <a:ln>
-            <a:solidFill>
-              <a:schemeClr val="tx1"/>
-            </a:solidFill>
-          </a:ln>
-        </p:spPr>
-        <p:style>
-          <a:lnRef idx="2">
-            <a:schemeClr val="accent1">
-              <a:shade val="50000"/>
-            </a:schemeClr>
-          </a:lnRef>
-          <a:fillRef idx="1">
-            <a:schemeClr val="accent1"/>
-          </a:fillRef>
-          <a:effectRef idx="0">
-            <a:schemeClr val="accent1"/>
-          </a:effectRef>
-          <a:fontRef idx="minor">
-            <a:schemeClr val="lt1"/>
-          </a:fontRef>
-        </p:style>
-        <p:txBody>
-          <a:bodyPr rtlCol="0" anchor="ctr"/>
-          <a:lstStyle/>
-          <a:p>
-            <a:pPr algn="ctr"/>
-            <a:r>
-              <a:rPr lang="en-US" sz="1400" dirty="0">
-                <a:solidFill>
-                  <a:schemeClr val="tx1"/>
-                </a:solidFill>
-              </a:rPr>
-              <a:t>Web</a:t>
-            </a:r>
-          </a:p>
-        </p:txBody>
-      </p:sp>
-      <p:cxnSp>
-        <p:nvCxnSpPr>
-          <p:cNvPr id="52" name="Elbow Connector 51"/>
-          <p:cNvCxnSpPr>
-            <a:stCxn id="2" idx="0"/>
-            <a:endCxn id="51" idx="2"/>
-          </p:cNvCxnSpPr>
-          <p:nvPr/>
-        </p:nvCxnSpPr>
-        <p:spPr>
-          <a:xfrm rot="5400000" flipH="1" flipV="1">
-            <a:off x="2222648" y="1760922"/>
-            <a:ext cx="476678" cy="383835"/>
-          </a:xfrm>
-          <a:prstGeom prst="bentConnector2">
-            <a:avLst/>
-          </a:prstGeom>
-          <a:ln w="28575">
-            <a:solidFill>
-              <a:srgbClr val="00B050"/>
-            </a:solidFill>
-            <a:prstDash val="sysDot"/>
-            <a:tailEnd type="arrow"/>
-          </a:ln>
-        </p:spPr>
-        <p:style>
-          <a:lnRef idx="1">
-            <a:schemeClr val="accent1"/>
-          </a:lnRef>
-          <a:fillRef idx="0">
-            <a:schemeClr val="accent1"/>
-          </a:fillRef>
-          <a:effectRef idx="0">
-            <a:schemeClr val="accent1"/>
-          </a:effectRef>
-          <a:fontRef idx="minor">
-            <a:schemeClr val="tx1"/>
-          </a:fontRef>
-        </p:style>
-      </p:cxnSp>
-      <p:sp>
-        <p:nvSpPr>
-          <p:cNvPr id="23" name="Rectangle 62"/>
-          <p:cNvSpPr/>
-          <p:nvPr/>
-        </p:nvSpPr>
-        <p:spPr>
-          <a:xfrm flipH="1">
-            <a:off x="1964269" y="3959459"/>
-            <a:ext cx="778931" cy="570908"/>
-          </a:xfrm>
-          <a:prstGeom prst="roundRect">
-            <a:avLst/>
-          </a:prstGeom>
-          <a:solidFill>
-            <a:srgbClr val="C00000"/>
-          </a:solidFill>
-          <a:ln w="19050">
-            <a:solidFill>
-              <a:srgbClr val="C00000"/>
-            </a:solidFill>
-          </a:ln>
-          <a:effectLst/>
-        </p:spPr>
-        <p:style>
-          <a:lnRef idx="1">
-            <a:schemeClr val="accent2"/>
-          </a:lnRef>
-          <a:fillRef idx="2">
-            <a:schemeClr val="accent2"/>
-          </a:fillRef>
-          <a:effectRef idx="1">
-            <a:schemeClr val="accent2"/>
-          </a:effectRef>
-          <a:fontRef idx="minor">
-            <a:schemeClr val="dk1"/>
-          </a:fontRef>
-        </p:style>
-        <p:txBody>
-          <a:bodyPr rtlCol="0" anchor="ctr"/>
-          <a:lstStyle/>
-          <a:p>
-            <a:pPr algn="ctr"/>
-            <a:r>
-              <a:rPr lang="en-US" sz="1600" dirty="0" smtClean="0">
-                <a:solidFill>
-                  <a:schemeClr val="bg1"/>
-                </a:solidFill>
-              </a:rPr>
-              <a:t>Main</a:t>
-            </a:r>
-            <a:endParaRPr lang="en-SG" sz="1600" dirty="0">
-              <a:solidFill>
-                <a:schemeClr val="bg1"/>
-              </a:solidFill>
-            </a:endParaRPr>
-          </a:p>
-        </p:txBody>
-      </p:sp>
-      <p:cxnSp>
-        <p:nvCxnSpPr>
-          <p:cNvPr id="30" name="Straight Arrow Connector 29"/>
-          <p:cNvCxnSpPr/>
-          <p:nvPr/>
-        </p:nvCxnSpPr>
-        <p:spPr>
-          <a:xfrm>
-            <a:off x="4945047" y="3750994"/>
-            <a:ext cx="0" cy="381000"/>
-          </a:xfrm>
-          <a:prstGeom prst="straightConnector1">
-            <a:avLst/>
-          </a:prstGeom>
-          <a:ln w="28575">
-            <a:solidFill>
-              <a:schemeClr val="accent5">
-                <a:lumMod val="75000"/>
-              </a:schemeClr>
-            </a:solidFill>
-            <a:prstDash val="sysDot"/>
-            <a:tailEnd type="arrow"/>
-          </a:ln>
-        </p:spPr>
-        <p:style>
-          <a:lnRef idx="1">
-            <a:schemeClr val="accent1"/>
-          </a:lnRef>
-          <a:fillRef idx="0">
-            <a:schemeClr val="accent1"/>
-          </a:fillRef>
-          <a:effectRef idx="0">
-            <a:schemeClr val="accent1"/>
-          </a:effectRef>
-          <a:fontRef idx="minor">
-            <a:schemeClr val="tx1"/>
-          </a:fontRef>
-        </p:style>
-      </p:cxnSp>
-      <p:cxnSp>
-        <p:nvCxnSpPr>
-          <p:cNvPr id="31" name="Straight Arrow Connector 30"/>
-          <p:cNvCxnSpPr/>
-          <p:nvPr/>
-        </p:nvCxnSpPr>
-        <p:spPr>
-          <a:xfrm>
-            <a:off x="5097447" y="3761908"/>
-            <a:ext cx="0" cy="381000"/>
-          </a:xfrm>
-          <a:prstGeom prst="straightConnector1">
-            <a:avLst/>
-          </a:prstGeom>
-          <a:ln w="28575">
-            <a:solidFill>
-              <a:schemeClr val="accent5">
-                <a:lumMod val="75000"/>
-              </a:schemeClr>
-            </a:solidFill>
-            <a:prstDash val="sysDot"/>
-            <a:tailEnd type="arrow"/>
-          </a:ln>
-        </p:spPr>
-        <p:style>
-          <a:lnRef idx="1">
-            <a:schemeClr val="accent1"/>
-          </a:lnRef>
-          <a:fillRef idx="0">
-            <a:schemeClr val="accent1"/>
-          </a:fillRef>
-          <a:effectRef idx="0">
-            <a:schemeClr val="accent1"/>
-          </a:effectRef>
-          <a:fontRef idx="minor">
-            <a:schemeClr val="tx1"/>
-          </a:fontRef>
-        </p:style>
-      </p:cxnSp>
-      <p:cxnSp>
-        <p:nvCxnSpPr>
-          <p:cNvPr id="33" name="Straight Arrow Connector 32"/>
-          <p:cNvCxnSpPr/>
-          <p:nvPr/>
-        </p:nvCxnSpPr>
-        <p:spPr>
-          <a:xfrm>
-            <a:off x="5249847" y="3750994"/>
-            <a:ext cx="0" cy="381000"/>
-          </a:xfrm>
-          <a:prstGeom prst="straightConnector1">
-            <a:avLst/>
-          </a:prstGeom>
-          <a:ln w="28575">
-            <a:solidFill>
-              <a:schemeClr val="accent5">
-                <a:lumMod val="75000"/>
-              </a:schemeClr>
-            </a:solidFill>
-            <a:prstDash val="sysDot"/>
-            <a:tailEnd type="arrow"/>
-          </a:ln>
-        </p:spPr>
-        <p:style>
-          <a:lnRef idx="1">
-            <a:schemeClr val="accent1"/>
-          </a:lnRef>
-          <a:fillRef idx="0">
-            <a:schemeClr val="accent1"/>
-          </a:fillRef>
-          <a:effectRef idx="0">
-            <a:schemeClr val="accent1"/>
-          </a:effectRef>
-          <a:fontRef idx="minor">
-            <a:schemeClr val="tx1"/>
-          </a:fontRef>
-        </p:style>
-      </p:cxnSp>
-      <p:cxnSp>
-        <p:nvCxnSpPr>
-          <p:cNvPr id="37" name="Straight Arrow Connector 36"/>
-          <p:cNvCxnSpPr>
-            <a:stCxn id="23" idx="1"/>
-          </p:cNvCxnSpPr>
-          <p:nvPr/>
-        </p:nvCxnSpPr>
-        <p:spPr>
-          <a:xfrm>
-            <a:off x="2743200" y="4244913"/>
-            <a:ext cx="249770" cy="0"/>
-          </a:xfrm>
-          <a:prstGeom prst="straightConnector1">
-            <a:avLst/>
-          </a:prstGeom>
-          <a:ln w="28575">
-            <a:solidFill>
-              <a:srgbClr val="C00000"/>
-            </a:solidFill>
-            <a:prstDash val="solid"/>
-            <a:tailEnd type="arrow"/>
-          </a:ln>
-        </p:spPr>
-        <p:style>
-          <a:lnRef idx="1">
-            <a:schemeClr val="accent1"/>
-          </a:lnRef>
-          <a:fillRef idx="0">
-            <a:schemeClr val="accent1"/>
-          </a:fillRef>
-          <a:effectRef idx="0">
-            <a:schemeClr val="accent1"/>
-          </a:effectRef>
-          <a:fontRef idx="minor">
-            <a:schemeClr val="tx1"/>
-          </a:fontRef>
-        </p:style>
-      </p:cxnSp>
-      <p:cxnSp>
-        <p:nvCxnSpPr>
-          <p:cNvPr id="38" name="Straight Arrow Connector 37"/>
-          <p:cNvCxnSpPr/>
-          <p:nvPr/>
-        </p:nvCxnSpPr>
-        <p:spPr>
-          <a:xfrm rot="13867188">
-            <a:off x="2743200" y="3755022"/>
-            <a:ext cx="0" cy="381000"/>
-          </a:xfrm>
-          <a:prstGeom prst="straightConnector1">
-            <a:avLst/>
-          </a:prstGeom>
-          <a:ln w="28575">
-            <a:solidFill>
-              <a:srgbClr val="C00000"/>
-            </a:solidFill>
-            <a:prstDash val="solid"/>
-            <a:tailEnd type="arrow"/>
-          </a:ln>
-        </p:spPr>
-        <p:style>
-          <a:lnRef idx="1">
-            <a:schemeClr val="accent1"/>
-          </a:lnRef>
-          <a:fillRef idx="0">
-            <a:schemeClr val="accent1"/>
-          </a:fillRef>
-          <a:effectRef idx="0">
-            <a:schemeClr val="accent1"/>
-          </a:effectRef>
-          <a:fontRef idx="minor">
-            <a:schemeClr val="tx1"/>
-          </a:fontRef>
-        </p:style>
-      </p:cxnSp>
-      <p:cxnSp>
-        <p:nvCxnSpPr>
-          <p:cNvPr id="39" name="Straight Arrow Connector 38"/>
-          <p:cNvCxnSpPr/>
-          <p:nvPr/>
-        </p:nvCxnSpPr>
-        <p:spPr>
-          <a:xfrm flipV="1">
-            <a:off x="2353734" y="3697061"/>
-            <a:ext cx="0" cy="301859"/>
-          </a:xfrm>
-          <a:prstGeom prst="straightConnector1">
-            <a:avLst/>
-          </a:prstGeom>
-          <a:ln w="28575">
-            <a:solidFill>
-              <a:srgbClr val="C00000"/>
-            </a:solidFill>
-            <a:prstDash val="solid"/>
-            <a:tailEnd type="arrow"/>
-          </a:ln>
-        </p:spPr>
-        <p:style>
-          <a:lnRef idx="1">
-            <a:schemeClr val="accent1"/>
-          </a:lnRef>
-          <a:fillRef idx="0">
-            <a:schemeClr val="accent1"/>
-          </a:fillRef>
-          <a:effectRef idx="0">
-            <a:schemeClr val="accent1"/>
-          </a:effectRef>
-          <a:fontRef idx="minor">
-            <a:schemeClr val="tx1"/>
-          </a:fontRef>
-        </p:style>
-      </p:cxnSp>
-      <p:sp>
-        <p:nvSpPr>
-          <p:cNvPr id="6" name="Oval 5"/>
-          <p:cNvSpPr/>
-          <p:nvPr/>
-        </p:nvSpPr>
-        <p:spPr>
-          <a:xfrm>
-            <a:off x="4936069" y="2909316"/>
-            <a:ext cx="1219201" cy="533400"/>
-          </a:xfrm>
-          <a:prstGeom prst="ellipse">
-            <a:avLst/>
-          </a:prstGeom>
-          <a:solidFill>
-            <a:schemeClr val="accent5">
-              <a:lumMod val="75000"/>
-            </a:schemeClr>
-          </a:solidFill>
-          <a:ln w="19050">
-            <a:solidFill>
-              <a:schemeClr val="accent5">
-                <a:lumMod val="75000"/>
-              </a:schemeClr>
-            </a:solidFill>
-          </a:ln>
-          <a:effectLst/>
-        </p:spPr>
-        <p:style>
-          <a:lnRef idx="1">
-            <a:schemeClr val="accent5"/>
-          </a:lnRef>
-          <a:fillRef idx="2">
-            <a:schemeClr val="accent5"/>
-          </a:fillRef>
-          <a:effectRef idx="1">
-            <a:schemeClr val="accent5"/>
-          </a:effectRef>
-          <a:fontRef idx="minor">
-            <a:schemeClr val="dk1"/>
-          </a:fontRef>
-        </p:style>
-        <p:txBody>
-          <a:bodyPr rtlCol="0" anchor="ctr"/>
-          <a:lstStyle/>
-          <a:p>
-            <a:pPr algn="ctr"/>
-            <a:r>
-              <a:rPr lang="en-US" sz="1600" dirty="0">
-                <a:solidFill>
-                  <a:schemeClr val="bg1"/>
-                </a:solidFill>
-              </a:rPr>
-              <a:t>Events Center</a:t>
-            </a:r>
-          </a:p>
-        </p:txBody>
-      </p:sp>
-      <p:sp>
-        <p:nvSpPr>
-          <p:cNvPr id="26" name="Oval 25"/>
-          <p:cNvSpPr/>
-          <p:nvPr/>
-        </p:nvSpPr>
-        <p:spPr>
-          <a:xfrm>
-            <a:off x="5888569" y="3515641"/>
-            <a:ext cx="1219201" cy="533400"/>
-          </a:xfrm>
-          <a:prstGeom prst="ellipse">
-            <a:avLst/>
-          </a:prstGeom>
-          <a:solidFill>
-            <a:schemeClr val="accent5">
-              <a:lumMod val="75000"/>
-            </a:schemeClr>
-          </a:solidFill>
-          <a:ln w="19050">
-            <a:solidFill>
-              <a:schemeClr val="accent5">
-                <a:lumMod val="75000"/>
-              </a:schemeClr>
-            </a:solidFill>
-          </a:ln>
-          <a:effectLst/>
-        </p:spPr>
-        <p:style>
-          <a:lnRef idx="1">
-            <a:schemeClr val="accent5"/>
-          </a:lnRef>
-          <a:fillRef idx="2">
-            <a:schemeClr val="accent5"/>
-          </a:fillRef>
-          <a:effectRef idx="1">
-            <a:schemeClr val="accent5"/>
-          </a:effectRef>
-          <a:fontRef idx="minor">
-            <a:schemeClr val="dk1"/>
-          </a:fontRef>
-        </p:style>
-        <p:txBody>
-          <a:bodyPr rtlCol="0" anchor="ctr"/>
-          <a:lstStyle/>
-          <a:p>
-            <a:pPr algn="ctr"/>
-            <a:r>
-              <a:rPr lang="en-US" sz="1600" dirty="0" smtClean="0">
-                <a:solidFill>
-                  <a:schemeClr val="bg1"/>
-                </a:solidFill>
-              </a:rPr>
-              <a:t>Logs</a:t>
-            </a:r>
-            <a:br>
-              <a:rPr lang="en-US" sz="1600" dirty="0" smtClean="0">
-                <a:solidFill>
-                  <a:schemeClr val="bg1"/>
-                </a:solidFill>
-              </a:rPr>
-            </a:br>
-            <a:r>
-              <a:rPr lang="en-US" sz="1600" dirty="0" smtClean="0">
-                <a:solidFill>
-                  <a:schemeClr val="bg1"/>
-                </a:solidFill>
-              </a:rPr>
-              <a:t>Center</a:t>
-            </a:r>
-            <a:endParaRPr lang="en-US" sz="1600" dirty="0">
-              <a:solidFill>
-                <a:schemeClr val="bg1"/>
-              </a:solidFill>
-            </a:endParaRPr>
-          </a:p>
-        </p:txBody>
-      </p:sp>
-      <p:cxnSp>
-        <p:nvCxnSpPr>
-          <p:cNvPr id="40" name="Elbow Connector 39"/>
-          <p:cNvCxnSpPr>
-            <a:stCxn id="26" idx="4"/>
-            <a:endCxn id="8" idx="3"/>
-          </p:cNvCxnSpPr>
-          <p:nvPr/>
-        </p:nvCxnSpPr>
-        <p:spPr>
-          <a:xfrm rot="5400000">
-            <a:off x="6034638" y="3890781"/>
-            <a:ext cx="305273" cy="621793"/>
-          </a:xfrm>
-          <a:prstGeom prst="bentConnector2">
-            <a:avLst/>
-          </a:prstGeom>
-          <a:ln w="28575">
-            <a:solidFill>
-              <a:schemeClr val="accent5">
-                <a:lumMod val="75000"/>
-              </a:schemeClr>
-            </a:solidFill>
-          </a:ln>
-        </p:spPr>
-        <p:style>
-          <a:lnRef idx="1">
-            <a:schemeClr val="accent1"/>
-          </a:lnRef>
-          <a:fillRef idx="0">
-            <a:schemeClr val="accent1"/>
-          </a:fillRef>
-          <a:effectRef idx="0">
-            <a:schemeClr val="accent1"/>
-          </a:effectRef>
-          <a:fontRef idx="minor">
-            <a:schemeClr val="tx1"/>
-          </a:fontRef>
-        </p:style>
-      </p:cxnSp>
-      <p:cxnSp>
-        <p:nvCxnSpPr>
-          <p:cNvPr id="9" name="Elbow Connector 8"/>
-          <p:cNvCxnSpPr>
-            <a:stCxn id="6" idx="4"/>
-          </p:cNvCxnSpPr>
-          <p:nvPr/>
-        </p:nvCxnSpPr>
-        <p:spPr>
-          <a:xfrm rot="5400000">
-            <a:off x="5195574" y="3792812"/>
-            <a:ext cx="700192" cy="1"/>
-          </a:xfrm>
-          <a:prstGeom prst="bentConnector3">
-            <a:avLst/>
-          </a:prstGeom>
-          <a:ln w="28575">
-            <a:solidFill>
-              <a:schemeClr val="accent5">
-                <a:lumMod val="75000"/>
-              </a:schemeClr>
-            </a:solidFill>
-          </a:ln>
-        </p:spPr>
-        <p:style>
-          <a:lnRef idx="1">
-            <a:schemeClr val="accent1"/>
-          </a:lnRef>
-          <a:fillRef idx="0">
-            <a:schemeClr val="accent1"/>
-          </a:fillRef>
-          <a:effectRef idx="0">
-            <a:schemeClr val="accent1"/>
-          </a:effectRef>
-          <a:fontRef idx="minor">
-            <a:schemeClr val="tx1"/>
-          </a:fontRef>
-        </p:style>
-      </p:cxnSp>
-    </p:spTree>
-    <p:extLst>
-      <p:ext uri="{BB962C8B-B14F-4D97-AF65-F5344CB8AC3E}">
-        <p14:creationId xmlns:p14="http://schemas.microsoft.com/office/powerpoint/2010/main" val="1981432603"/>
-      </p:ext>
-    </p:extLst>
-  </p:cSld>
-  <p:clrMapOvr>
-    <a:masterClrMapping/>
-  </p:clrMapOvr>
-</p:sld>
 </file>
 
 <file path=ppt/theme/theme1.xml><?xml version="1.0" encoding="utf-8"?>

</xml_diff>

<commit_message>
Updated diagrams in developer guide
</commit_message>
<xml_diff>
--- a/docs/diagrams/ArchitectureDiagram.pptx
+++ b/docs/diagrams/ArchitectureDiagram.pptx
@@ -107,6 +107,22 @@
       </a:defRPr>
     </a:lvl9pPr>
   </p:defaultTextStyle>
+  <p:extLst>
+    <p:ext uri="{EFAFB233-063F-42B5-8137-9DF3F51BA10A}">
+      <p15:sldGuideLst xmlns:p15="http://schemas.microsoft.com/office/powerpoint/2012/main">
+        <p15:guide id="1" orient="horz" pos="1488">
+          <p15:clr>
+            <a:srgbClr val="A4A3A4"/>
+          </p15:clr>
+        </p15:guide>
+        <p15:guide id="2" pos="2880">
+          <p15:clr>
+            <a:srgbClr val="A4A3A4"/>
+          </p15:clr>
+        </p15:guide>
+      </p15:sldGuideLst>
+    </p:ext>
+  </p:extLst>
 </p:presentation>
 </file>
 
@@ -192,7 +208,7 @@
           <a:p>
             <a:fld id="{F5CC4B3F-88C1-4FFA-B1B6-F41C21DC6924}" type="datetimeFigureOut">
               <a:rPr lang="en-US" smtClean="0"/>
-              <a:t>10/16/2016</a:t>
+              <a:t>12-Nov-17</a:t>
             </a:fld>
             <a:endParaRPr lang="en-US"/>
           </a:p>
@@ -641,7 +657,7 @@
           <a:p>
             <a:fld id="{78C97017-6FC3-485B-9764-EAC9E56C1D49}" type="datetimeFigureOut">
               <a:rPr lang="en-US" smtClean="0"/>
-              <a:t>10/16/2016</a:t>
+              <a:t>12-Nov-17</a:t>
             </a:fld>
             <a:endParaRPr lang="en-US"/>
           </a:p>
@@ -811,7 +827,7 @@
           <a:p>
             <a:fld id="{78C97017-6FC3-485B-9764-EAC9E56C1D49}" type="datetimeFigureOut">
               <a:rPr lang="en-US" smtClean="0"/>
-              <a:t>10/16/2016</a:t>
+              <a:t>12-Nov-17</a:t>
             </a:fld>
             <a:endParaRPr lang="en-US"/>
           </a:p>
@@ -991,7 +1007,7 @@
           <a:p>
             <a:fld id="{78C97017-6FC3-485B-9764-EAC9E56C1D49}" type="datetimeFigureOut">
               <a:rPr lang="en-US" smtClean="0"/>
-              <a:t>10/16/2016</a:t>
+              <a:t>12-Nov-17</a:t>
             </a:fld>
             <a:endParaRPr lang="en-US"/>
           </a:p>
@@ -1161,7 +1177,7 @@
           <a:p>
             <a:fld id="{78C97017-6FC3-485B-9764-EAC9E56C1D49}" type="datetimeFigureOut">
               <a:rPr lang="en-US" smtClean="0"/>
-              <a:t>10/16/2016</a:t>
+              <a:t>12-Nov-17</a:t>
             </a:fld>
             <a:endParaRPr lang="en-US"/>
           </a:p>
@@ -1407,7 +1423,7 @@
           <a:p>
             <a:fld id="{78C97017-6FC3-485B-9764-EAC9E56C1D49}" type="datetimeFigureOut">
               <a:rPr lang="en-US" smtClean="0"/>
-              <a:t>10/16/2016</a:t>
+              <a:t>12-Nov-17</a:t>
             </a:fld>
             <a:endParaRPr lang="en-US"/>
           </a:p>
@@ -1695,7 +1711,7 @@
           <a:p>
             <a:fld id="{78C97017-6FC3-485B-9764-EAC9E56C1D49}" type="datetimeFigureOut">
               <a:rPr lang="en-US" smtClean="0"/>
-              <a:t>10/16/2016</a:t>
+              <a:t>12-Nov-17</a:t>
             </a:fld>
             <a:endParaRPr lang="en-US"/>
           </a:p>
@@ -2117,7 +2133,7 @@
           <a:p>
             <a:fld id="{78C97017-6FC3-485B-9764-EAC9E56C1D49}" type="datetimeFigureOut">
               <a:rPr lang="en-US" smtClean="0"/>
-              <a:t>10/16/2016</a:t>
+              <a:t>12-Nov-17</a:t>
             </a:fld>
             <a:endParaRPr lang="en-US"/>
           </a:p>
@@ -2235,7 +2251,7 @@
           <a:p>
             <a:fld id="{78C97017-6FC3-485B-9764-EAC9E56C1D49}" type="datetimeFigureOut">
               <a:rPr lang="en-US" smtClean="0"/>
-              <a:t>10/16/2016</a:t>
+              <a:t>12-Nov-17</a:t>
             </a:fld>
             <a:endParaRPr lang="en-US"/>
           </a:p>
@@ -2330,7 +2346,7 @@
           <a:p>
             <a:fld id="{78C97017-6FC3-485B-9764-EAC9E56C1D49}" type="datetimeFigureOut">
               <a:rPr lang="en-US" smtClean="0"/>
-              <a:t>10/16/2016</a:t>
+              <a:t>12-Nov-17</a:t>
             </a:fld>
             <a:endParaRPr lang="en-US"/>
           </a:p>
@@ -2607,7 +2623,7 @@
           <a:p>
             <a:fld id="{78C97017-6FC3-485B-9764-EAC9E56C1D49}" type="datetimeFigureOut">
               <a:rPr lang="en-US" smtClean="0"/>
-              <a:t>10/16/2016</a:t>
+              <a:t>12-Nov-17</a:t>
             </a:fld>
             <a:endParaRPr lang="en-US"/>
           </a:p>
@@ -2860,7 +2876,7 @@
           <a:p>
             <a:fld id="{78C97017-6FC3-485B-9764-EAC9E56C1D49}" type="datetimeFigureOut">
               <a:rPr lang="en-US" smtClean="0"/>
-              <a:t>10/16/2016</a:t>
+              <a:t>12-Nov-17</a:t>
             </a:fld>
             <a:endParaRPr lang="en-US"/>
           </a:p>
@@ -3073,7 +3089,7 @@
           <a:p>
             <a:fld id="{78C97017-6FC3-485B-9764-EAC9E56C1D49}" type="datetimeFigureOut">
               <a:rPr lang="en-US" smtClean="0"/>
-              <a:t>10/16/2016</a:t>
+              <a:t>12-Nov-17</a:t>
             </a:fld>
             <a:endParaRPr lang="en-US"/>
           </a:p>
@@ -4182,8 +4198,8 @@
         </p:nvSpPr>
         <p:spPr>
           <a:xfrm>
-            <a:off x="2650069" y="1447800"/>
-            <a:ext cx="914400" cy="533400"/>
+            <a:off x="1956250" y="702056"/>
+            <a:ext cx="1412395" cy="823897"/>
           </a:xfrm>
           <a:prstGeom prst="cloud">
             <a:avLst/>
@@ -4219,13 +4235,33 @@
           <a:p>
             <a:pPr algn="ctr"/>
             <a:r>
-              <a:rPr lang="en-US" sz="1400" dirty="0">
+              <a:rPr lang="en-US" sz="1400" dirty="0" smtClean="0">
                 <a:solidFill>
                   <a:schemeClr val="tx1"/>
                 </a:solidFill>
               </a:rPr>
-              <a:t>Web</a:t>
-            </a:r>
+              <a:t>Social Media</a:t>
+            </a:r>
+            <a:br>
+              <a:rPr lang="en-US" sz="1400" dirty="0" smtClean="0">
+                <a:solidFill>
+                  <a:schemeClr val="tx1"/>
+                </a:solidFill>
+              </a:rPr>
+            </a:br>
+            <a:r>
+              <a:rPr lang="en-US" sz="1400" dirty="0" smtClean="0">
+                <a:solidFill>
+                  <a:schemeClr val="tx1"/>
+                </a:solidFill>
+              </a:rPr>
+              <a:t>Sites</a:t>
+            </a:r>
+            <a:endParaRPr lang="en-US" sz="1400" dirty="0">
+              <a:solidFill>
+                <a:schemeClr val="tx1"/>
+              </a:solidFill>
+            </a:endParaRPr>
           </a:p>
         </p:txBody>
       </p:sp>
@@ -4239,12 +4275,15 @@
           <p:nvPr/>
         </p:nvCxnSpPr>
         <p:spPr>
-          <a:xfrm rot="5400000" flipH="1" flipV="1">
-            <a:off x="2222648" y="1760922"/>
-            <a:ext cx="476678" cy="383835"/>
-          </a:xfrm>
-          <a:prstGeom prst="bentConnector2">
-            <a:avLst/>
+          <a:xfrm rot="16200000" flipV="1">
+            <a:off x="1576265" y="1498372"/>
+            <a:ext cx="1077173" cy="308439"/>
+          </a:xfrm>
+          <a:prstGeom prst="bentConnector4">
+            <a:avLst>
+              <a:gd name="adj1" fmla="val 30878"/>
+              <a:gd name="adj2" fmla="val 175536"/>
+            </a:avLst>
           </a:prstGeom>
           <a:ln w="28575">
             <a:solidFill>
@@ -4756,6 +4795,108 @@
                 <a:lumMod val="75000"/>
               </a:schemeClr>
             </a:solidFill>
+          </a:ln>
+        </p:spPr>
+        <p:style>
+          <a:lnRef idx="1">
+            <a:schemeClr val="accent1"/>
+          </a:lnRef>
+          <a:fillRef idx="0">
+            <a:schemeClr val="accent1"/>
+          </a:fillRef>
+          <a:effectRef idx="0">
+            <a:schemeClr val="accent1"/>
+          </a:effectRef>
+          <a:fontRef idx="minor">
+            <a:schemeClr val="tx1"/>
+          </a:fontRef>
+        </p:style>
+      </p:cxnSp>
+      <p:sp>
+        <p:nvSpPr>
+          <p:cNvPr id="41" name="Cloud 40"/>
+          <p:cNvSpPr/>
+          <p:nvPr/>
+        </p:nvSpPr>
+        <p:spPr>
+          <a:xfrm>
+            <a:off x="3407837" y="1202007"/>
+            <a:ext cx="1412395" cy="823897"/>
+          </a:xfrm>
+          <a:prstGeom prst="cloud">
+            <a:avLst/>
+          </a:prstGeom>
+          <a:solidFill>
+            <a:schemeClr val="bg1"/>
+          </a:solidFill>
+          <a:ln>
+            <a:solidFill>
+              <a:schemeClr val="tx1"/>
+            </a:solidFill>
+          </a:ln>
+        </p:spPr>
+        <p:style>
+          <a:lnRef idx="2">
+            <a:schemeClr val="accent1">
+              <a:shade val="50000"/>
+            </a:schemeClr>
+          </a:lnRef>
+          <a:fillRef idx="1">
+            <a:schemeClr val="accent1"/>
+          </a:fillRef>
+          <a:effectRef idx="0">
+            <a:schemeClr val="accent1"/>
+          </a:effectRef>
+          <a:fontRef idx="minor">
+            <a:schemeClr val="lt1"/>
+          </a:fontRef>
+        </p:style>
+        <p:txBody>
+          <a:bodyPr rtlCol="0" anchor="ctr"/>
+          <a:lstStyle/>
+          <a:p>
+            <a:pPr algn="ctr"/>
+            <a:r>
+              <a:rPr lang="en-US" sz="1400" dirty="0" smtClean="0">
+                <a:solidFill>
+                  <a:schemeClr val="tx1"/>
+                </a:solidFill>
+              </a:rPr>
+              <a:t>Google Calendar</a:t>
+            </a:r>
+            <a:endParaRPr lang="en-US" sz="1400" dirty="0">
+              <a:solidFill>
+                <a:schemeClr val="tx1"/>
+              </a:solidFill>
+            </a:endParaRPr>
+          </a:p>
+        </p:txBody>
+      </p:sp>
+      <p:cxnSp>
+        <p:nvCxnSpPr>
+          <p:cNvPr id="42" name="Elbow Connector 41"/>
+          <p:cNvCxnSpPr>
+            <a:stCxn id="41" idx="2"/>
+            <a:endCxn id="5" idx="1"/>
+          </p:cNvCxnSpPr>
+          <p:nvPr/>
+        </p:nvCxnSpPr>
+        <p:spPr>
+          <a:xfrm rot="10800000" flipV="1">
+            <a:off x="3412070" y="1613956"/>
+            <a:ext cx="149" cy="1872140"/>
+          </a:xfrm>
+          <a:prstGeom prst="bentConnector3">
+            <a:avLst>
+              <a:gd name="adj1" fmla="val 156363087"/>
+            </a:avLst>
+          </a:prstGeom>
+          <a:ln w="28575">
+            <a:solidFill>
+              <a:srgbClr val="7030A0"/>
+            </a:solidFill>
+            <a:prstDash val="sysDot"/>
+            <a:tailEnd type="arrow"/>
           </a:ln>
         </p:spPr>
         <p:style>

</xml_diff>

<commit_message>
Merged and integrated changes
</commit_message>
<xml_diff>
--- a/docs/diagrams/ArchitectureDiagram.pptx
+++ b/docs/diagrams/ArchitectureDiagram.pptx
@@ -107,6 +107,22 @@
       </a:defRPr>
     </a:lvl9pPr>
   </p:defaultTextStyle>
+  <p:extLst>
+    <p:ext uri="{EFAFB233-063F-42B5-8137-9DF3F51BA10A}">
+      <p15:sldGuideLst xmlns:p15="http://schemas.microsoft.com/office/powerpoint/2012/main">
+        <p15:guide id="1" orient="horz" pos="1488">
+          <p15:clr>
+            <a:srgbClr val="A4A3A4"/>
+          </p15:clr>
+        </p15:guide>
+        <p15:guide id="2" pos="2880">
+          <p15:clr>
+            <a:srgbClr val="A4A3A4"/>
+          </p15:clr>
+        </p15:guide>
+      </p15:sldGuideLst>
+    </p:ext>
+  </p:extLst>
 </p:presentation>
 </file>
 
@@ -192,7 +208,7 @@
           <a:p>
             <a:fld id="{F5CC4B3F-88C1-4FFA-B1B6-F41C21DC6924}" type="datetimeFigureOut">
               <a:rPr lang="en-US" smtClean="0"/>
-              <a:t>10/16/2016</a:t>
+              <a:t>12-Nov-17</a:t>
             </a:fld>
             <a:endParaRPr lang="en-US"/>
           </a:p>
@@ -641,7 +657,7 @@
           <a:p>
             <a:fld id="{78C97017-6FC3-485B-9764-EAC9E56C1D49}" type="datetimeFigureOut">
               <a:rPr lang="en-US" smtClean="0"/>
-              <a:t>10/16/2016</a:t>
+              <a:t>12-Nov-17</a:t>
             </a:fld>
             <a:endParaRPr lang="en-US"/>
           </a:p>
@@ -811,7 +827,7 @@
           <a:p>
             <a:fld id="{78C97017-6FC3-485B-9764-EAC9E56C1D49}" type="datetimeFigureOut">
               <a:rPr lang="en-US" smtClean="0"/>
-              <a:t>10/16/2016</a:t>
+              <a:t>12-Nov-17</a:t>
             </a:fld>
             <a:endParaRPr lang="en-US"/>
           </a:p>
@@ -991,7 +1007,7 @@
           <a:p>
             <a:fld id="{78C97017-6FC3-485B-9764-EAC9E56C1D49}" type="datetimeFigureOut">
               <a:rPr lang="en-US" smtClean="0"/>
-              <a:t>10/16/2016</a:t>
+              <a:t>12-Nov-17</a:t>
             </a:fld>
             <a:endParaRPr lang="en-US"/>
           </a:p>
@@ -1161,7 +1177,7 @@
           <a:p>
             <a:fld id="{78C97017-6FC3-485B-9764-EAC9E56C1D49}" type="datetimeFigureOut">
               <a:rPr lang="en-US" smtClean="0"/>
-              <a:t>10/16/2016</a:t>
+              <a:t>12-Nov-17</a:t>
             </a:fld>
             <a:endParaRPr lang="en-US"/>
           </a:p>
@@ -1407,7 +1423,7 @@
           <a:p>
             <a:fld id="{78C97017-6FC3-485B-9764-EAC9E56C1D49}" type="datetimeFigureOut">
               <a:rPr lang="en-US" smtClean="0"/>
-              <a:t>10/16/2016</a:t>
+              <a:t>12-Nov-17</a:t>
             </a:fld>
             <a:endParaRPr lang="en-US"/>
           </a:p>
@@ -1695,7 +1711,7 @@
           <a:p>
             <a:fld id="{78C97017-6FC3-485B-9764-EAC9E56C1D49}" type="datetimeFigureOut">
               <a:rPr lang="en-US" smtClean="0"/>
-              <a:t>10/16/2016</a:t>
+              <a:t>12-Nov-17</a:t>
             </a:fld>
             <a:endParaRPr lang="en-US"/>
           </a:p>
@@ -2117,7 +2133,7 @@
           <a:p>
             <a:fld id="{78C97017-6FC3-485B-9764-EAC9E56C1D49}" type="datetimeFigureOut">
               <a:rPr lang="en-US" smtClean="0"/>
-              <a:t>10/16/2016</a:t>
+              <a:t>12-Nov-17</a:t>
             </a:fld>
             <a:endParaRPr lang="en-US"/>
           </a:p>
@@ -2235,7 +2251,7 @@
           <a:p>
             <a:fld id="{78C97017-6FC3-485B-9764-EAC9E56C1D49}" type="datetimeFigureOut">
               <a:rPr lang="en-US" smtClean="0"/>
-              <a:t>10/16/2016</a:t>
+              <a:t>12-Nov-17</a:t>
             </a:fld>
             <a:endParaRPr lang="en-US"/>
           </a:p>
@@ -2330,7 +2346,7 @@
           <a:p>
             <a:fld id="{78C97017-6FC3-485B-9764-EAC9E56C1D49}" type="datetimeFigureOut">
               <a:rPr lang="en-US" smtClean="0"/>
-              <a:t>10/16/2016</a:t>
+              <a:t>12-Nov-17</a:t>
             </a:fld>
             <a:endParaRPr lang="en-US"/>
           </a:p>
@@ -2607,7 +2623,7 @@
           <a:p>
             <a:fld id="{78C97017-6FC3-485B-9764-EAC9E56C1D49}" type="datetimeFigureOut">
               <a:rPr lang="en-US" smtClean="0"/>
-              <a:t>10/16/2016</a:t>
+              <a:t>12-Nov-17</a:t>
             </a:fld>
             <a:endParaRPr lang="en-US"/>
           </a:p>
@@ -2860,7 +2876,7 @@
           <a:p>
             <a:fld id="{78C97017-6FC3-485B-9764-EAC9E56C1D49}" type="datetimeFigureOut">
               <a:rPr lang="en-US" smtClean="0"/>
-              <a:t>10/16/2016</a:t>
+              <a:t>12-Nov-17</a:t>
             </a:fld>
             <a:endParaRPr lang="en-US"/>
           </a:p>
@@ -3073,7 +3089,7 @@
           <a:p>
             <a:fld id="{78C97017-6FC3-485B-9764-EAC9E56C1D49}" type="datetimeFigureOut">
               <a:rPr lang="en-US" smtClean="0"/>
-              <a:t>10/16/2016</a:t>
+              <a:t>12-Nov-17</a:t>
             </a:fld>
             <a:endParaRPr lang="en-US"/>
           </a:p>
@@ -4182,8 +4198,8 @@
         </p:nvSpPr>
         <p:spPr>
           <a:xfrm>
-            <a:off x="2650069" y="1447800"/>
-            <a:ext cx="914400" cy="533400"/>
+            <a:off x="1956250" y="702056"/>
+            <a:ext cx="1412395" cy="823897"/>
           </a:xfrm>
           <a:prstGeom prst="cloud">
             <a:avLst/>
@@ -4219,13 +4235,33 @@
           <a:p>
             <a:pPr algn="ctr"/>
             <a:r>
-              <a:rPr lang="en-US" sz="1400" dirty="0">
+              <a:rPr lang="en-US" sz="1400" dirty="0" smtClean="0">
                 <a:solidFill>
                   <a:schemeClr val="tx1"/>
                 </a:solidFill>
               </a:rPr>
-              <a:t>Web</a:t>
-            </a:r>
+              <a:t>Social Media</a:t>
+            </a:r>
+            <a:br>
+              <a:rPr lang="en-US" sz="1400" dirty="0" smtClean="0">
+                <a:solidFill>
+                  <a:schemeClr val="tx1"/>
+                </a:solidFill>
+              </a:rPr>
+            </a:br>
+            <a:r>
+              <a:rPr lang="en-US" sz="1400" dirty="0" smtClean="0">
+                <a:solidFill>
+                  <a:schemeClr val="tx1"/>
+                </a:solidFill>
+              </a:rPr>
+              <a:t>Sites</a:t>
+            </a:r>
+            <a:endParaRPr lang="en-US" sz="1400" dirty="0">
+              <a:solidFill>
+                <a:schemeClr val="tx1"/>
+              </a:solidFill>
+            </a:endParaRPr>
           </a:p>
         </p:txBody>
       </p:sp>
@@ -4239,12 +4275,15 @@
           <p:nvPr/>
         </p:nvCxnSpPr>
         <p:spPr>
-          <a:xfrm rot="5400000" flipH="1" flipV="1">
-            <a:off x="2222648" y="1760922"/>
-            <a:ext cx="476678" cy="383835"/>
-          </a:xfrm>
-          <a:prstGeom prst="bentConnector2">
-            <a:avLst/>
+          <a:xfrm rot="16200000" flipV="1">
+            <a:off x="1576265" y="1498372"/>
+            <a:ext cx="1077173" cy="308439"/>
+          </a:xfrm>
+          <a:prstGeom prst="bentConnector4">
+            <a:avLst>
+              <a:gd name="adj1" fmla="val 30878"/>
+              <a:gd name="adj2" fmla="val 175536"/>
+            </a:avLst>
           </a:prstGeom>
           <a:ln w="28575">
             <a:solidFill>
@@ -4756,6 +4795,108 @@
                 <a:lumMod val="75000"/>
               </a:schemeClr>
             </a:solidFill>
+          </a:ln>
+        </p:spPr>
+        <p:style>
+          <a:lnRef idx="1">
+            <a:schemeClr val="accent1"/>
+          </a:lnRef>
+          <a:fillRef idx="0">
+            <a:schemeClr val="accent1"/>
+          </a:fillRef>
+          <a:effectRef idx="0">
+            <a:schemeClr val="accent1"/>
+          </a:effectRef>
+          <a:fontRef idx="minor">
+            <a:schemeClr val="tx1"/>
+          </a:fontRef>
+        </p:style>
+      </p:cxnSp>
+      <p:sp>
+        <p:nvSpPr>
+          <p:cNvPr id="41" name="Cloud 40"/>
+          <p:cNvSpPr/>
+          <p:nvPr/>
+        </p:nvSpPr>
+        <p:spPr>
+          <a:xfrm>
+            <a:off x="3407837" y="1202007"/>
+            <a:ext cx="1412395" cy="823897"/>
+          </a:xfrm>
+          <a:prstGeom prst="cloud">
+            <a:avLst/>
+          </a:prstGeom>
+          <a:solidFill>
+            <a:schemeClr val="bg1"/>
+          </a:solidFill>
+          <a:ln>
+            <a:solidFill>
+              <a:schemeClr val="tx1"/>
+            </a:solidFill>
+          </a:ln>
+        </p:spPr>
+        <p:style>
+          <a:lnRef idx="2">
+            <a:schemeClr val="accent1">
+              <a:shade val="50000"/>
+            </a:schemeClr>
+          </a:lnRef>
+          <a:fillRef idx="1">
+            <a:schemeClr val="accent1"/>
+          </a:fillRef>
+          <a:effectRef idx="0">
+            <a:schemeClr val="accent1"/>
+          </a:effectRef>
+          <a:fontRef idx="minor">
+            <a:schemeClr val="lt1"/>
+          </a:fontRef>
+        </p:style>
+        <p:txBody>
+          <a:bodyPr rtlCol="0" anchor="ctr"/>
+          <a:lstStyle/>
+          <a:p>
+            <a:pPr algn="ctr"/>
+            <a:r>
+              <a:rPr lang="en-US" sz="1400" dirty="0" smtClean="0">
+                <a:solidFill>
+                  <a:schemeClr val="tx1"/>
+                </a:solidFill>
+              </a:rPr>
+              <a:t>Google Calendar</a:t>
+            </a:r>
+            <a:endParaRPr lang="en-US" sz="1400" dirty="0">
+              <a:solidFill>
+                <a:schemeClr val="tx1"/>
+              </a:solidFill>
+            </a:endParaRPr>
+          </a:p>
+        </p:txBody>
+      </p:sp>
+      <p:cxnSp>
+        <p:nvCxnSpPr>
+          <p:cNvPr id="42" name="Elbow Connector 41"/>
+          <p:cNvCxnSpPr>
+            <a:stCxn id="41" idx="2"/>
+            <a:endCxn id="5" idx="1"/>
+          </p:cNvCxnSpPr>
+          <p:nvPr/>
+        </p:nvCxnSpPr>
+        <p:spPr>
+          <a:xfrm rot="10800000" flipV="1">
+            <a:off x="3412070" y="1613956"/>
+            <a:ext cx="149" cy="1872140"/>
+          </a:xfrm>
+          <a:prstGeom prst="bentConnector3">
+            <a:avLst>
+              <a:gd name="adj1" fmla="val 156363087"/>
+            </a:avLst>
+          </a:prstGeom>
+          <a:ln w="28575">
+            <a:solidFill>
+              <a:srgbClr val="7030A0"/>
+            </a:solidFill>
+            <a:prstDash val="sysDot"/>
+            <a:tailEnd type="arrow"/>
           </a:ln>
         </p:spPr>
         <p:style>

</xml_diff>